<commit_message>
updated for codestock slide
</commit_message>
<xml_diff>
--- a/Presentations/Lucene/Lucene.pptx
+++ b/Presentations/Lucene/Lucene.pptx
@@ -5,14 +5,16 @@
     <p:sldMasterId id="2147483648" r:id="rId1"/>
     <p:sldMasterId id="2147483660" r:id="rId2"/>
     <p:sldMasterId id="2147483672" r:id="rId3"/>
+    <p:sldMasterId id="2147483684" r:id="rId4"/>
   </p:sldMasterIdLst>
   <p:sldIdLst>
-    <p:sldId id="256" r:id="rId4"/>
-    <p:sldId id="257" r:id="rId5"/>
-    <p:sldId id="258" r:id="rId6"/>
-    <p:sldId id="259" r:id="rId7"/>
-    <p:sldId id="260" r:id="rId8"/>
-    <p:sldId id="261" r:id="rId9"/>
+    <p:sldId id="256" r:id="rId5"/>
+    <p:sldId id="262" r:id="rId6"/>
+    <p:sldId id="257" r:id="rId7"/>
+    <p:sldId id="258" r:id="rId8"/>
+    <p:sldId id="259" r:id="rId9"/>
+    <p:sldId id="260" r:id="rId10"/>
+    <p:sldId id="261" r:id="rId11"/>
   </p:sldIdLst>
   <p:sldSz cx="9144000" cy="6858000" type="screen4x3"/>
   <p:notesSz cx="6858000" cy="9144000"/>
@@ -7019,7 +7021,800 @@
 </p:sldLayout>
 </file>
 
-<file path=ppt/slideLayouts/slideLayout4.xml><?xml version="1.0" encoding="utf-8"?>
+<file path=ppt/slideLayouts/slideLayout34.xml><?xml version="1.0" encoding="utf-8"?>
+<p:sldLayout xmlns:a="http://schemas.openxmlformats.org/drawingml/2006/main" xmlns:r="http://schemas.openxmlformats.org/officeDocument/2006/relationships" xmlns:p="http://schemas.openxmlformats.org/presentationml/2006/main" type="title" preserve="1">
+  <p:cSld name="Title Slide">
+    <p:spTree>
+      <p:nvGrpSpPr>
+        <p:cNvPr id="1" name=""/>
+        <p:cNvGrpSpPr/>
+        <p:nvPr/>
+      </p:nvGrpSpPr>
+      <p:grpSpPr>
+        <a:xfrm>
+          <a:off x="0" y="0"/>
+          <a:ext cx="0" cy="0"/>
+          <a:chOff x="0" y="0"/>
+          <a:chExt cx="0" cy="0"/>
+        </a:xfrm>
+      </p:grpSpPr>
+      <p:sp>
+        <p:nvSpPr>
+          <p:cNvPr id="2" name="Title 1"/>
+          <p:cNvSpPr>
+            <a:spLocks noGrp="1"/>
+          </p:cNvSpPr>
+          <p:nvPr>
+            <p:ph type="ctrTitle"/>
+          </p:nvPr>
+        </p:nvSpPr>
+        <p:spPr>
+          <a:xfrm>
+            <a:off x="685800" y="2130425"/>
+            <a:ext cx="7772400" cy="1470025"/>
+          </a:xfrm>
+        </p:spPr>
+        <p:txBody>
+          <a:bodyPr/>
+          <a:lstStyle/>
+          <a:p>
+            <a:r>
+              <a:rPr lang="en-US" smtClean="0"/>
+              <a:t>Click to edit Master title style</a:t>
+            </a:r>
+            <a:endParaRPr lang="en-US"/>
+          </a:p>
+        </p:txBody>
+      </p:sp>
+      <p:sp>
+        <p:nvSpPr>
+          <p:cNvPr id="3" name="Subtitle 2"/>
+          <p:cNvSpPr>
+            <a:spLocks noGrp="1"/>
+          </p:cNvSpPr>
+          <p:nvPr>
+            <p:ph type="subTitle" idx="1"/>
+          </p:nvPr>
+        </p:nvSpPr>
+        <p:spPr>
+          <a:xfrm>
+            <a:off x="1371600" y="3886200"/>
+            <a:ext cx="6400800" cy="1752600"/>
+          </a:xfrm>
+        </p:spPr>
+        <p:txBody>
+          <a:bodyPr/>
+          <a:lstStyle>
+            <a:lvl1pPr marL="0" indent="0" algn="ctr">
+              <a:buNone/>
+              <a:defRPr>
+                <a:solidFill>
+                  <a:schemeClr val="tx1">
+                    <a:tint val="75000"/>
+                  </a:schemeClr>
+                </a:solidFill>
+              </a:defRPr>
+            </a:lvl1pPr>
+            <a:lvl2pPr marL="457200" indent="0" algn="ctr">
+              <a:buNone/>
+              <a:defRPr>
+                <a:solidFill>
+                  <a:schemeClr val="tx1">
+                    <a:tint val="75000"/>
+                  </a:schemeClr>
+                </a:solidFill>
+              </a:defRPr>
+            </a:lvl2pPr>
+            <a:lvl3pPr marL="914400" indent="0" algn="ctr">
+              <a:buNone/>
+              <a:defRPr>
+                <a:solidFill>
+                  <a:schemeClr val="tx1">
+                    <a:tint val="75000"/>
+                  </a:schemeClr>
+                </a:solidFill>
+              </a:defRPr>
+            </a:lvl3pPr>
+            <a:lvl4pPr marL="1371600" indent="0" algn="ctr">
+              <a:buNone/>
+              <a:defRPr>
+                <a:solidFill>
+                  <a:schemeClr val="tx1">
+                    <a:tint val="75000"/>
+                  </a:schemeClr>
+                </a:solidFill>
+              </a:defRPr>
+            </a:lvl4pPr>
+            <a:lvl5pPr marL="1828800" indent="0" algn="ctr">
+              <a:buNone/>
+              <a:defRPr>
+                <a:solidFill>
+                  <a:schemeClr val="tx1">
+                    <a:tint val="75000"/>
+                  </a:schemeClr>
+                </a:solidFill>
+              </a:defRPr>
+            </a:lvl5pPr>
+            <a:lvl6pPr marL="2286000" indent="0" algn="ctr">
+              <a:buNone/>
+              <a:defRPr>
+                <a:solidFill>
+                  <a:schemeClr val="tx1">
+                    <a:tint val="75000"/>
+                  </a:schemeClr>
+                </a:solidFill>
+              </a:defRPr>
+            </a:lvl6pPr>
+            <a:lvl7pPr marL="2743200" indent="0" algn="ctr">
+              <a:buNone/>
+              <a:defRPr>
+                <a:solidFill>
+                  <a:schemeClr val="tx1">
+                    <a:tint val="75000"/>
+                  </a:schemeClr>
+                </a:solidFill>
+              </a:defRPr>
+            </a:lvl7pPr>
+            <a:lvl8pPr marL="3200400" indent="0" algn="ctr">
+              <a:buNone/>
+              <a:defRPr>
+                <a:solidFill>
+                  <a:schemeClr val="tx1">
+                    <a:tint val="75000"/>
+                  </a:schemeClr>
+                </a:solidFill>
+              </a:defRPr>
+            </a:lvl8pPr>
+            <a:lvl9pPr marL="3657600" indent="0" algn="ctr">
+              <a:buNone/>
+              <a:defRPr>
+                <a:solidFill>
+                  <a:schemeClr val="tx1">
+                    <a:tint val="75000"/>
+                  </a:schemeClr>
+                </a:solidFill>
+              </a:defRPr>
+            </a:lvl9pPr>
+          </a:lstStyle>
+          <a:p>
+            <a:r>
+              <a:rPr lang="en-US" smtClean="0"/>
+              <a:t>Click to edit Master subtitle style</a:t>
+            </a:r>
+            <a:endParaRPr lang="en-US"/>
+          </a:p>
+        </p:txBody>
+      </p:sp>
+      <p:sp>
+        <p:nvSpPr>
+          <p:cNvPr id="4" name="Date Placeholder 3"/>
+          <p:cNvSpPr>
+            <a:spLocks noGrp="1"/>
+          </p:cNvSpPr>
+          <p:nvPr>
+            <p:ph type="dt" sz="half" idx="10"/>
+          </p:nvPr>
+        </p:nvSpPr>
+        <p:spPr/>
+        <p:txBody>
+          <a:bodyPr/>
+          <a:lstStyle/>
+          <a:p>
+            <a:pPr algn="l" rtl="0"/>
+            <a:fld id="{E5B1AC9D-7C8A-4BB3-B152-489FC1CA0160}" type="datetimeFigureOut">
+              <a:rPr lang="en-US" sz="1200" kern="1200">
+                <a:solidFill>
+                  <a:prstClr val="white">
+                    <a:tint val="75000"/>
+                  </a:prstClr>
+                </a:solidFill>
+                <a:latin typeface="Calibri"/>
+                <a:ea typeface="+mn-ea"/>
+                <a:cs typeface="+mn-cs"/>
+              </a:rPr>
+              <a:pPr algn="l" rtl="0"/>
+              <a:t>3/12/2009</a:t>
+            </a:fld>
+            <a:endParaRPr lang="en-US" sz="1200" kern="1200">
+              <a:solidFill>
+                <a:prstClr val="white">
+                  <a:tint val="75000"/>
+                </a:prstClr>
+              </a:solidFill>
+              <a:latin typeface="Calibri"/>
+              <a:ea typeface="+mn-ea"/>
+              <a:cs typeface="+mn-cs"/>
+            </a:endParaRPr>
+          </a:p>
+        </p:txBody>
+      </p:sp>
+      <p:sp>
+        <p:nvSpPr>
+          <p:cNvPr id="5" name="Footer Placeholder 4"/>
+          <p:cNvSpPr>
+            <a:spLocks noGrp="1"/>
+          </p:cNvSpPr>
+          <p:nvPr>
+            <p:ph type="ftr" sz="quarter" idx="11"/>
+          </p:nvPr>
+        </p:nvSpPr>
+        <p:spPr/>
+        <p:txBody>
+          <a:bodyPr/>
+          <a:lstStyle/>
+          <a:p>
+            <a:pPr algn="ctr" rtl="0"/>
+            <a:endParaRPr lang="en-US" sz="1200" kern="1200">
+              <a:solidFill>
+                <a:prstClr val="white">
+                  <a:tint val="75000"/>
+                </a:prstClr>
+              </a:solidFill>
+              <a:latin typeface="Calibri"/>
+              <a:ea typeface="+mn-ea"/>
+              <a:cs typeface="+mn-cs"/>
+            </a:endParaRPr>
+          </a:p>
+        </p:txBody>
+      </p:sp>
+      <p:sp>
+        <p:nvSpPr>
+          <p:cNvPr id="6" name="Slide Number Placeholder 5"/>
+          <p:cNvSpPr>
+            <a:spLocks noGrp="1"/>
+          </p:cNvSpPr>
+          <p:nvPr>
+            <p:ph type="sldNum" sz="quarter" idx="12"/>
+          </p:nvPr>
+        </p:nvSpPr>
+        <p:spPr/>
+        <p:txBody>
+          <a:bodyPr/>
+          <a:lstStyle/>
+          <a:p>
+            <a:pPr algn="r" rtl="0"/>
+            <a:fld id="{37093969-7AAB-46EA-AA3B-E867A8062A99}" type="slidenum">
+              <a:rPr lang="en-US" sz="1200" kern="1200">
+                <a:solidFill>
+                  <a:prstClr val="white">
+                    <a:tint val="75000"/>
+                  </a:prstClr>
+                </a:solidFill>
+                <a:latin typeface="Calibri"/>
+                <a:ea typeface="+mn-ea"/>
+                <a:cs typeface="+mn-cs"/>
+              </a:rPr>
+              <a:pPr algn="r" rtl="0"/>
+              <a:t>‹#›</a:t>
+            </a:fld>
+            <a:endParaRPr lang="en-US" sz="1200" kern="1200">
+              <a:solidFill>
+                <a:prstClr val="white">
+                  <a:tint val="75000"/>
+                </a:prstClr>
+              </a:solidFill>
+              <a:latin typeface="Calibri"/>
+              <a:ea typeface="+mn-ea"/>
+              <a:cs typeface="+mn-cs"/>
+            </a:endParaRPr>
+          </a:p>
+        </p:txBody>
+      </p:sp>
+    </p:spTree>
+  </p:cSld>
+  <p:clrMapOvr>
+    <a:masterClrMapping/>
+  </p:clrMapOvr>
+</p:sldLayout>
+</file>
+
+<file path=ppt/slideLayouts/slideLayout35.xml><?xml version="1.0" encoding="utf-8"?>
+<p:sldLayout xmlns:a="http://schemas.openxmlformats.org/drawingml/2006/main" xmlns:r="http://schemas.openxmlformats.org/officeDocument/2006/relationships" xmlns:p="http://schemas.openxmlformats.org/presentationml/2006/main" type="obj" preserve="1">
+  <p:cSld name="Title and Content">
+    <p:spTree>
+      <p:nvGrpSpPr>
+        <p:cNvPr id="1" name=""/>
+        <p:cNvGrpSpPr/>
+        <p:nvPr/>
+      </p:nvGrpSpPr>
+      <p:grpSpPr>
+        <a:xfrm>
+          <a:off x="0" y="0"/>
+          <a:ext cx="0" cy="0"/>
+          <a:chOff x="0" y="0"/>
+          <a:chExt cx="0" cy="0"/>
+        </a:xfrm>
+      </p:grpSpPr>
+      <p:sp>
+        <p:nvSpPr>
+          <p:cNvPr id="2" name="Title 1"/>
+          <p:cNvSpPr>
+            <a:spLocks noGrp="1"/>
+          </p:cNvSpPr>
+          <p:nvPr>
+            <p:ph type="title"/>
+          </p:nvPr>
+        </p:nvSpPr>
+        <p:spPr/>
+        <p:txBody>
+          <a:bodyPr/>
+          <a:lstStyle/>
+          <a:p>
+            <a:r>
+              <a:rPr lang="en-US" smtClean="0"/>
+              <a:t>Click to edit Master title style</a:t>
+            </a:r>
+            <a:endParaRPr lang="en-US"/>
+          </a:p>
+        </p:txBody>
+      </p:sp>
+      <p:sp>
+        <p:nvSpPr>
+          <p:cNvPr id="3" name="Content Placeholder 2"/>
+          <p:cNvSpPr>
+            <a:spLocks noGrp="1"/>
+          </p:cNvSpPr>
+          <p:nvPr>
+            <p:ph idx="1"/>
+          </p:nvPr>
+        </p:nvSpPr>
+        <p:spPr/>
+        <p:txBody>
+          <a:bodyPr/>
+          <a:lstStyle/>
+          <a:p>
+            <a:pPr lvl="0"/>
+            <a:r>
+              <a:rPr lang="en-US" smtClean="0"/>
+              <a:t>Click to edit Master text styles</a:t>
+            </a:r>
+          </a:p>
+          <a:p>
+            <a:pPr lvl="1"/>
+            <a:r>
+              <a:rPr lang="en-US" smtClean="0"/>
+              <a:t>Second level</a:t>
+            </a:r>
+          </a:p>
+          <a:p>
+            <a:pPr lvl="2"/>
+            <a:r>
+              <a:rPr lang="en-US" smtClean="0"/>
+              <a:t>Third level</a:t>
+            </a:r>
+          </a:p>
+          <a:p>
+            <a:pPr lvl="3"/>
+            <a:r>
+              <a:rPr lang="en-US" smtClean="0"/>
+              <a:t>Fourth level</a:t>
+            </a:r>
+          </a:p>
+          <a:p>
+            <a:pPr lvl="4"/>
+            <a:r>
+              <a:rPr lang="en-US" smtClean="0"/>
+              <a:t>Fifth level</a:t>
+            </a:r>
+            <a:endParaRPr lang="en-US"/>
+          </a:p>
+        </p:txBody>
+      </p:sp>
+      <p:sp>
+        <p:nvSpPr>
+          <p:cNvPr id="4" name="Date Placeholder 3"/>
+          <p:cNvSpPr>
+            <a:spLocks noGrp="1"/>
+          </p:cNvSpPr>
+          <p:nvPr>
+            <p:ph type="dt" sz="half" idx="10"/>
+          </p:nvPr>
+        </p:nvSpPr>
+        <p:spPr/>
+        <p:txBody>
+          <a:bodyPr/>
+          <a:lstStyle/>
+          <a:p>
+            <a:pPr algn="l" rtl="0"/>
+            <a:fld id="{E5B1AC9D-7C8A-4BB3-B152-489FC1CA0160}" type="datetimeFigureOut">
+              <a:rPr lang="en-US" sz="1200" kern="1200">
+                <a:solidFill>
+                  <a:prstClr val="white">
+                    <a:tint val="75000"/>
+                  </a:prstClr>
+                </a:solidFill>
+                <a:latin typeface="Calibri"/>
+                <a:ea typeface="+mn-ea"/>
+                <a:cs typeface="+mn-cs"/>
+              </a:rPr>
+              <a:pPr algn="l" rtl="0"/>
+              <a:t>3/12/2009</a:t>
+            </a:fld>
+            <a:endParaRPr lang="en-US" sz="1200" kern="1200">
+              <a:solidFill>
+                <a:prstClr val="white">
+                  <a:tint val="75000"/>
+                </a:prstClr>
+              </a:solidFill>
+              <a:latin typeface="Calibri"/>
+              <a:ea typeface="+mn-ea"/>
+              <a:cs typeface="+mn-cs"/>
+            </a:endParaRPr>
+          </a:p>
+        </p:txBody>
+      </p:sp>
+      <p:sp>
+        <p:nvSpPr>
+          <p:cNvPr id="5" name="Footer Placeholder 4"/>
+          <p:cNvSpPr>
+            <a:spLocks noGrp="1"/>
+          </p:cNvSpPr>
+          <p:nvPr>
+            <p:ph type="ftr" sz="quarter" idx="11"/>
+          </p:nvPr>
+        </p:nvSpPr>
+        <p:spPr/>
+        <p:txBody>
+          <a:bodyPr/>
+          <a:lstStyle/>
+          <a:p>
+            <a:pPr algn="ctr" rtl="0"/>
+            <a:endParaRPr lang="en-US" sz="1200" kern="1200">
+              <a:solidFill>
+                <a:prstClr val="white">
+                  <a:tint val="75000"/>
+                </a:prstClr>
+              </a:solidFill>
+              <a:latin typeface="Calibri"/>
+              <a:ea typeface="+mn-ea"/>
+              <a:cs typeface="+mn-cs"/>
+            </a:endParaRPr>
+          </a:p>
+        </p:txBody>
+      </p:sp>
+      <p:sp>
+        <p:nvSpPr>
+          <p:cNvPr id="6" name="Slide Number Placeholder 5"/>
+          <p:cNvSpPr>
+            <a:spLocks noGrp="1"/>
+          </p:cNvSpPr>
+          <p:nvPr>
+            <p:ph type="sldNum" sz="quarter" idx="12"/>
+          </p:nvPr>
+        </p:nvSpPr>
+        <p:spPr/>
+        <p:txBody>
+          <a:bodyPr/>
+          <a:lstStyle/>
+          <a:p>
+            <a:pPr algn="r" rtl="0"/>
+            <a:fld id="{37093969-7AAB-46EA-AA3B-E867A8062A99}" type="slidenum">
+              <a:rPr lang="en-US" sz="1200" kern="1200">
+                <a:solidFill>
+                  <a:prstClr val="white">
+                    <a:tint val="75000"/>
+                  </a:prstClr>
+                </a:solidFill>
+                <a:latin typeface="Calibri"/>
+                <a:ea typeface="+mn-ea"/>
+                <a:cs typeface="+mn-cs"/>
+              </a:rPr>
+              <a:pPr algn="r" rtl="0"/>
+              <a:t>‹#›</a:t>
+            </a:fld>
+            <a:endParaRPr lang="en-US" sz="1200" kern="1200">
+              <a:solidFill>
+                <a:prstClr val="white">
+                  <a:tint val="75000"/>
+                </a:prstClr>
+              </a:solidFill>
+              <a:latin typeface="Calibri"/>
+              <a:ea typeface="+mn-ea"/>
+              <a:cs typeface="+mn-cs"/>
+            </a:endParaRPr>
+          </a:p>
+        </p:txBody>
+      </p:sp>
+    </p:spTree>
+  </p:cSld>
+  <p:clrMapOvr>
+    <a:masterClrMapping/>
+  </p:clrMapOvr>
+</p:sldLayout>
+</file>
+
+<file path=ppt/slideLayouts/slideLayout36.xml><?xml version="1.0" encoding="utf-8"?>
+<p:sldLayout xmlns:a="http://schemas.openxmlformats.org/drawingml/2006/main" xmlns:r="http://schemas.openxmlformats.org/officeDocument/2006/relationships" xmlns:p="http://schemas.openxmlformats.org/presentationml/2006/main" type="secHead" preserve="1">
+  <p:cSld name="Section Header">
+    <p:spTree>
+      <p:nvGrpSpPr>
+        <p:cNvPr id="1" name=""/>
+        <p:cNvGrpSpPr/>
+        <p:nvPr/>
+      </p:nvGrpSpPr>
+      <p:grpSpPr>
+        <a:xfrm>
+          <a:off x="0" y="0"/>
+          <a:ext cx="0" cy="0"/>
+          <a:chOff x="0" y="0"/>
+          <a:chExt cx="0" cy="0"/>
+        </a:xfrm>
+      </p:grpSpPr>
+      <p:sp>
+        <p:nvSpPr>
+          <p:cNvPr id="2" name="Title 1"/>
+          <p:cNvSpPr>
+            <a:spLocks noGrp="1"/>
+          </p:cNvSpPr>
+          <p:nvPr>
+            <p:ph type="title"/>
+          </p:nvPr>
+        </p:nvSpPr>
+        <p:spPr>
+          <a:xfrm>
+            <a:off x="722313" y="4406900"/>
+            <a:ext cx="7772400" cy="1362075"/>
+          </a:xfrm>
+        </p:spPr>
+        <p:txBody>
+          <a:bodyPr anchor="t"/>
+          <a:lstStyle>
+            <a:lvl1pPr algn="l">
+              <a:defRPr sz="4000" b="1" cap="all"/>
+            </a:lvl1pPr>
+          </a:lstStyle>
+          <a:p>
+            <a:r>
+              <a:rPr lang="en-US" smtClean="0"/>
+              <a:t>Click to edit Master title style</a:t>
+            </a:r>
+            <a:endParaRPr lang="en-US"/>
+          </a:p>
+        </p:txBody>
+      </p:sp>
+      <p:sp>
+        <p:nvSpPr>
+          <p:cNvPr id="3" name="Text Placeholder 2"/>
+          <p:cNvSpPr>
+            <a:spLocks noGrp="1"/>
+          </p:cNvSpPr>
+          <p:nvPr>
+            <p:ph type="body" idx="1"/>
+          </p:nvPr>
+        </p:nvSpPr>
+        <p:spPr>
+          <a:xfrm>
+            <a:off x="722313" y="2906713"/>
+            <a:ext cx="7772400" cy="1500187"/>
+          </a:xfrm>
+        </p:spPr>
+        <p:txBody>
+          <a:bodyPr anchor="b"/>
+          <a:lstStyle>
+            <a:lvl1pPr marL="0" indent="0">
+              <a:buNone/>
+              <a:defRPr sz="2000">
+                <a:solidFill>
+                  <a:schemeClr val="tx1">
+                    <a:tint val="75000"/>
+                  </a:schemeClr>
+                </a:solidFill>
+              </a:defRPr>
+            </a:lvl1pPr>
+            <a:lvl2pPr marL="457200" indent="0">
+              <a:buNone/>
+              <a:defRPr sz="1800">
+                <a:solidFill>
+                  <a:schemeClr val="tx1">
+                    <a:tint val="75000"/>
+                  </a:schemeClr>
+                </a:solidFill>
+              </a:defRPr>
+            </a:lvl2pPr>
+            <a:lvl3pPr marL="914400" indent="0">
+              <a:buNone/>
+              <a:defRPr sz="1600">
+                <a:solidFill>
+                  <a:schemeClr val="tx1">
+                    <a:tint val="75000"/>
+                  </a:schemeClr>
+                </a:solidFill>
+              </a:defRPr>
+            </a:lvl3pPr>
+            <a:lvl4pPr marL="1371600" indent="0">
+              <a:buNone/>
+              <a:defRPr sz="1400">
+                <a:solidFill>
+                  <a:schemeClr val="tx1">
+                    <a:tint val="75000"/>
+                  </a:schemeClr>
+                </a:solidFill>
+              </a:defRPr>
+            </a:lvl4pPr>
+            <a:lvl5pPr marL="1828800" indent="0">
+              <a:buNone/>
+              <a:defRPr sz="1400">
+                <a:solidFill>
+                  <a:schemeClr val="tx1">
+                    <a:tint val="75000"/>
+                  </a:schemeClr>
+                </a:solidFill>
+              </a:defRPr>
+            </a:lvl5pPr>
+            <a:lvl6pPr marL="2286000" indent="0">
+              <a:buNone/>
+              <a:defRPr sz="1400">
+                <a:solidFill>
+                  <a:schemeClr val="tx1">
+                    <a:tint val="75000"/>
+                  </a:schemeClr>
+                </a:solidFill>
+              </a:defRPr>
+            </a:lvl6pPr>
+            <a:lvl7pPr marL="2743200" indent="0">
+              <a:buNone/>
+              <a:defRPr sz="1400">
+                <a:solidFill>
+                  <a:schemeClr val="tx1">
+                    <a:tint val="75000"/>
+                  </a:schemeClr>
+                </a:solidFill>
+              </a:defRPr>
+            </a:lvl7pPr>
+            <a:lvl8pPr marL="3200400" indent="0">
+              <a:buNone/>
+              <a:defRPr sz="1400">
+                <a:solidFill>
+                  <a:schemeClr val="tx1">
+                    <a:tint val="75000"/>
+                  </a:schemeClr>
+                </a:solidFill>
+              </a:defRPr>
+            </a:lvl8pPr>
+            <a:lvl9pPr marL="3657600" indent="0">
+              <a:buNone/>
+              <a:defRPr sz="1400">
+                <a:solidFill>
+                  <a:schemeClr val="tx1">
+                    <a:tint val="75000"/>
+                  </a:schemeClr>
+                </a:solidFill>
+              </a:defRPr>
+            </a:lvl9pPr>
+          </a:lstStyle>
+          <a:p>
+            <a:pPr lvl="0"/>
+            <a:r>
+              <a:rPr lang="en-US" smtClean="0"/>
+              <a:t>Click to edit Master text styles</a:t>
+            </a:r>
+          </a:p>
+        </p:txBody>
+      </p:sp>
+      <p:sp>
+        <p:nvSpPr>
+          <p:cNvPr id="4" name="Date Placeholder 3"/>
+          <p:cNvSpPr>
+            <a:spLocks noGrp="1"/>
+          </p:cNvSpPr>
+          <p:nvPr>
+            <p:ph type="dt" sz="half" idx="10"/>
+          </p:nvPr>
+        </p:nvSpPr>
+        <p:spPr/>
+        <p:txBody>
+          <a:bodyPr/>
+          <a:lstStyle/>
+          <a:p>
+            <a:pPr algn="l" rtl="0"/>
+            <a:fld id="{E5B1AC9D-7C8A-4BB3-B152-489FC1CA0160}" type="datetimeFigureOut">
+              <a:rPr lang="en-US" sz="1200" kern="1200">
+                <a:solidFill>
+                  <a:prstClr val="white">
+                    <a:tint val="75000"/>
+                  </a:prstClr>
+                </a:solidFill>
+                <a:latin typeface="Calibri"/>
+                <a:ea typeface="+mn-ea"/>
+                <a:cs typeface="+mn-cs"/>
+              </a:rPr>
+              <a:pPr algn="l" rtl="0"/>
+              <a:t>3/12/2009</a:t>
+            </a:fld>
+            <a:endParaRPr lang="en-US" sz="1200" kern="1200">
+              <a:solidFill>
+                <a:prstClr val="white">
+                  <a:tint val="75000"/>
+                </a:prstClr>
+              </a:solidFill>
+              <a:latin typeface="Calibri"/>
+              <a:ea typeface="+mn-ea"/>
+              <a:cs typeface="+mn-cs"/>
+            </a:endParaRPr>
+          </a:p>
+        </p:txBody>
+      </p:sp>
+      <p:sp>
+        <p:nvSpPr>
+          <p:cNvPr id="5" name="Footer Placeholder 4"/>
+          <p:cNvSpPr>
+            <a:spLocks noGrp="1"/>
+          </p:cNvSpPr>
+          <p:nvPr>
+            <p:ph type="ftr" sz="quarter" idx="11"/>
+          </p:nvPr>
+        </p:nvSpPr>
+        <p:spPr/>
+        <p:txBody>
+          <a:bodyPr/>
+          <a:lstStyle/>
+          <a:p>
+            <a:pPr algn="ctr" rtl="0"/>
+            <a:endParaRPr lang="en-US" sz="1200" kern="1200">
+              <a:solidFill>
+                <a:prstClr val="white">
+                  <a:tint val="75000"/>
+                </a:prstClr>
+              </a:solidFill>
+              <a:latin typeface="Calibri"/>
+              <a:ea typeface="+mn-ea"/>
+              <a:cs typeface="+mn-cs"/>
+            </a:endParaRPr>
+          </a:p>
+        </p:txBody>
+      </p:sp>
+      <p:sp>
+        <p:nvSpPr>
+          <p:cNvPr id="6" name="Slide Number Placeholder 5"/>
+          <p:cNvSpPr>
+            <a:spLocks noGrp="1"/>
+          </p:cNvSpPr>
+          <p:nvPr>
+            <p:ph type="sldNum" sz="quarter" idx="12"/>
+          </p:nvPr>
+        </p:nvSpPr>
+        <p:spPr/>
+        <p:txBody>
+          <a:bodyPr/>
+          <a:lstStyle/>
+          <a:p>
+            <a:pPr algn="r" rtl="0"/>
+            <a:fld id="{37093969-7AAB-46EA-AA3B-E867A8062A99}" type="slidenum">
+              <a:rPr lang="en-US" sz="1200" kern="1200">
+                <a:solidFill>
+                  <a:prstClr val="white">
+                    <a:tint val="75000"/>
+                  </a:prstClr>
+                </a:solidFill>
+                <a:latin typeface="Calibri"/>
+                <a:ea typeface="+mn-ea"/>
+                <a:cs typeface="+mn-cs"/>
+              </a:rPr>
+              <a:pPr algn="r" rtl="0"/>
+              <a:t>‹#›</a:t>
+            </a:fld>
+            <a:endParaRPr lang="en-US" sz="1200" kern="1200">
+              <a:solidFill>
+                <a:prstClr val="white">
+                  <a:tint val="75000"/>
+                </a:prstClr>
+              </a:solidFill>
+              <a:latin typeface="Calibri"/>
+              <a:ea typeface="+mn-ea"/>
+              <a:cs typeface="+mn-cs"/>
+            </a:endParaRPr>
+          </a:p>
+        </p:txBody>
+      </p:sp>
+    </p:spTree>
+  </p:cSld>
+  <p:clrMapOvr>
+    <a:masterClrMapping/>
+  </p:clrMapOvr>
+</p:sldLayout>
+</file>
+
+<file path=ppt/slideLayouts/slideLayout37.xml><?xml version="1.0" encoding="utf-8"?>
 <p:sldLayout xmlns:a="http://schemas.openxmlformats.org/drawingml/2006/main" xmlns:r="http://schemas.openxmlformats.org/officeDocument/2006/relationships" xmlns:p="http://schemas.openxmlformats.org/presentationml/2006/main" type="twoObj" preserve="1">
   <p:cSld name="Two Content">
     <p:spTree>
@@ -7244,6 +8039,969 @@
           <a:bodyPr/>
           <a:lstStyle/>
           <a:p>
+            <a:pPr algn="l" rtl="0"/>
+            <a:fld id="{E5B1AC9D-7C8A-4BB3-B152-489FC1CA0160}" type="datetimeFigureOut">
+              <a:rPr lang="en-US" sz="1200" kern="1200">
+                <a:solidFill>
+                  <a:prstClr val="white">
+                    <a:tint val="75000"/>
+                  </a:prstClr>
+                </a:solidFill>
+                <a:latin typeface="Calibri"/>
+                <a:ea typeface="+mn-ea"/>
+                <a:cs typeface="+mn-cs"/>
+              </a:rPr>
+              <a:pPr algn="l" rtl="0"/>
+              <a:t>3/12/2009</a:t>
+            </a:fld>
+            <a:endParaRPr lang="en-US" sz="1200" kern="1200">
+              <a:solidFill>
+                <a:prstClr val="white">
+                  <a:tint val="75000"/>
+                </a:prstClr>
+              </a:solidFill>
+              <a:latin typeface="Calibri"/>
+              <a:ea typeface="+mn-ea"/>
+              <a:cs typeface="+mn-cs"/>
+            </a:endParaRPr>
+          </a:p>
+        </p:txBody>
+      </p:sp>
+      <p:sp>
+        <p:nvSpPr>
+          <p:cNvPr id="6" name="Footer Placeholder 5"/>
+          <p:cNvSpPr>
+            <a:spLocks noGrp="1"/>
+          </p:cNvSpPr>
+          <p:nvPr>
+            <p:ph type="ftr" sz="quarter" idx="11"/>
+          </p:nvPr>
+        </p:nvSpPr>
+        <p:spPr/>
+        <p:txBody>
+          <a:bodyPr/>
+          <a:lstStyle/>
+          <a:p>
+            <a:pPr algn="ctr" rtl="0"/>
+            <a:endParaRPr lang="en-US" sz="1200" kern="1200">
+              <a:solidFill>
+                <a:prstClr val="white">
+                  <a:tint val="75000"/>
+                </a:prstClr>
+              </a:solidFill>
+              <a:latin typeface="Calibri"/>
+              <a:ea typeface="+mn-ea"/>
+              <a:cs typeface="+mn-cs"/>
+            </a:endParaRPr>
+          </a:p>
+        </p:txBody>
+      </p:sp>
+      <p:sp>
+        <p:nvSpPr>
+          <p:cNvPr id="7" name="Slide Number Placeholder 6"/>
+          <p:cNvSpPr>
+            <a:spLocks noGrp="1"/>
+          </p:cNvSpPr>
+          <p:nvPr>
+            <p:ph type="sldNum" sz="quarter" idx="12"/>
+          </p:nvPr>
+        </p:nvSpPr>
+        <p:spPr/>
+        <p:txBody>
+          <a:bodyPr/>
+          <a:lstStyle/>
+          <a:p>
+            <a:pPr algn="r" rtl="0"/>
+            <a:fld id="{37093969-7AAB-46EA-AA3B-E867A8062A99}" type="slidenum">
+              <a:rPr lang="en-US" sz="1200" kern="1200">
+                <a:solidFill>
+                  <a:prstClr val="white">
+                    <a:tint val="75000"/>
+                  </a:prstClr>
+                </a:solidFill>
+                <a:latin typeface="Calibri"/>
+                <a:ea typeface="+mn-ea"/>
+                <a:cs typeface="+mn-cs"/>
+              </a:rPr>
+              <a:pPr algn="r" rtl="0"/>
+              <a:t>‹#›</a:t>
+            </a:fld>
+            <a:endParaRPr lang="en-US" sz="1200" kern="1200">
+              <a:solidFill>
+                <a:prstClr val="white">
+                  <a:tint val="75000"/>
+                </a:prstClr>
+              </a:solidFill>
+              <a:latin typeface="Calibri"/>
+              <a:ea typeface="+mn-ea"/>
+              <a:cs typeface="+mn-cs"/>
+            </a:endParaRPr>
+          </a:p>
+        </p:txBody>
+      </p:sp>
+    </p:spTree>
+  </p:cSld>
+  <p:clrMapOvr>
+    <a:masterClrMapping/>
+  </p:clrMapOvr>
+</p:sldLayout>
+</file>
+
+<file path=ppt/slideLayouts/slideLayout38.xml><?xml version="1.0" encoding="utf-8"?>
+<p:sldLayout xmlns:a="http://schemas.openxmlformats.org/drawingml/2006/main" xmlns:r="http://schemas.openxmlformats.org/officeDocument/2006/relationships" xmlns:p="http://schemas.openxmlformats.org/presentationml/2006/main" type="twoTxTwoObj" preserve="1">
+  <p:cSld name="Comparison">
+    <p:spTree>
+      <p:nvGrpSpPr>
+        <p:cNvPr id="1" name=""/>
+        <p:cNvGrpSpPr/>
+        <p:nvPr/>
+      </p:nvGrpSpPr>
+      <p:grpSpPr>
+        <a:xfrm>
+          <a:off x="0" y="0"/>
+          <a:ext cx="0" cy="0"/>
+          <a:chOff x="0" y="0"/>
+          <a:chExt cx="0" cy="0"/>
+        </a:xfrm>
+      </p:grpSpPr>
+      <p:sp>
+        <p:nvSpPr>
+          <p:cNvPr id="2" name="Title 1"/>
+          <p:cNvSpPr>
+            <a:spLocks noGrp="1"/>
+          </p:cNvSpPr>
+          <p:nvPr>
+            <p:ph type="title"/>
+          </p:nvPr>
+        </p:nvSpPr>
+        <p:spPr/>
+        <p:txBody>
+          <a:bodyPr/>
+          <a:lstStyle>
+            <a:lvl1pPr>
+              <a:defRPr/>
+            </a:lvl1pPr>
+          </a:lstStyle>
+          <a:p>
+            <a:r>
+              <a:rPr lang="en-US" smtClean="0"/>
+              <a:t>Click to edit Master title style</a:t>
+            </a:r>
+            <a:endParaRPr lang="en-US"/>
+          </a:p>
+        </p:txBody>
+      </p:sp>
+      <p:sp>
+        <p:nvSpPr>
+          <p:cNvPr id="3" name="Text Placeholder 2"/>
+          <p:cNvSpPr>
+            <a:spLocks noGrp="1"/>
+          </p:cNvSpPr>
+          <p:nvPr>
+            <p:ph type="body" idx="1"/>
+          </p:nvPr>
+        </p:nvSpPr>
+        <p:spPr>
+          <a:xfrm>
+            <a:off x="457200" y="1535113"/>
+            <a:ext cx="4040188" cy="639762"/>
+          </a:xfrm>
+        </p:spPr>
+        <p:txBody>
+          <a:bodyPr anchor="b"/>
+          <a:lstStyle>
+            <a:lvl1pPr marL="0" indent="0">
+              <a:buNone/>
+              <a:defRPr sz="2400" b="1"/>
+            </a:lvl1pPr>
+            <a:lvl2pPr marL="457200" indent="0">
+              <a:buNone/>
+              <a:defRPr sz="2000" b="1"/>
+            </a:lvl2pPr>
+            <a:lvl3pPr marL="914400" indent="0">
+              <a:buNone/>
+              <a:defRPr sz="1800" b="1"/>
+            </a:lvl3pPr>
+            <a:lvl4pPr marL="1371600" indent="0">
+              <a:buNone/>
+              <a:defRPr sz="1600" b="1"/>
+            </a:lvl4pPr>
+            <a:lvl5pPr marL="1828800" indent="0">
+              <a:buNone/>
+              <a:defRPr sz="1600" b="1"/>
+            </a:lvl5pPr>
+            <a:lvl6pPr marL="2286000" indent="0">
+              <a:buNone/>
+              <a:defRPr sz="1600" b="1"/>
+            </a:lvl6pPr>
+            <a:lvl7pPr marL="2743200" indent="0">
+              <a:buNone/>
+              <a:defRPr sz="1600" b="1"/>
+            </a:lvl7pPr>
+            <a:lvl8pPr marL="3200400" indent="0">
+              <a:buNone/>
+              <a:defRPr sz="1600" b="1"/>
+            </a:lvl8pPr>
+            <a:lvl9pPr marL="3657600" indent="0">
+              <a:buNone/>
+              <a:defRPr sz="1600" b="1"/>
+            </a:lvl9pPr>
+          </a:lstStyle>
+          <a:p>
+            <a:pPr lvl="0"/>
+            <a:r>
+              <a:rPr lang="en-US" smtClean="0"/>
+              <a:t>Click to edit Master text styles</a:t>
+            </a:r>
+          </a:p>
+        </p:txBody>
+      </p:sp>
+      <p:sp>
+        <p:nvSpPr>
+          <p:cNvPr id="4" name="Content Placeholder 3"/>
+          <p:cNvSpPr>
+            <a:spLocks noGrp="1"/>
+          </p:cNvSpPr>
+          <p:nvPr>
+            <p:ph sz="half" idx="2"/>
+          </p:nvPr>
+        </p:nvSpPr>
+        <p:spPr>
+          <a:xfrm>
+            <a:off x="457200" y="2174875"/>
+            <a:ext cx="4040188" cy="3951288"/>
+          </a:xfrm>
+        </p:spPr>
+        <p:txBody>
+          <a:bodyPr/>
+          <a:lstStyle>
+            <a:lvl1pPr>
+              <a:defRPr sz="2400"/>
+            </a:lvl1pPr>
+            <a:lvl2pPr>
+              <a:defRPr sz="2000"/>
+            </a:lvl2pPr>
+            <a:lvl3pPr>
+              <a:defRPr sz="1800"/>
+            </a:lvl3pPr>
+            <a:lvl4pPr>
+              <a:defRPr sz="1600"/>
+            </a:lvl4pPr>
+            <a:lvl5pPr>
+              <a:defRPr sz="1600"/>
+            </a:lvl5pPr>
+            <a:lvl6pPr>
+              <a:defRPr sz="1600"/>
+            </a:lvl6pPr>
+            <a:lvl7pPr>
+              <a:defRPr sz="1600"/>
+            </a:lvl7pPr>
+            <a:lvl8pPr>
+              <a:defRPr sz="1600"/>
+            </a:lvl8pPr>
+            <a:lvl9pPr>
+              <a:defRPr sz="1600"/>
+            </a:lvl9pPr>
+          </a:lstStyle>
+          <a:p>
+            <a:pPr lvl="0"/>
+            <a:r>
+              <a:rPr lang="en-US" smtClean="0"/>
+              <a:t>Click to edit Master text styles</a:t>
+            </a:r>
+          </a:p>
+          <a:p>
+            <a:pPr lvl="1"/>
+            <a:r>
+              <a:rPr lang="en-US" smtClean="0"/>
+              <a:t>Second level</a:t>
+            </a:r>
+          </a:p>
+          <a:p>
+            <a:pPr lvl="2"/>
+            <a:r>
+              <a:rPr lang="en-US" smtClean="0"/>
+              <a:t>Third level</a:t>
+            </a:r>
+          </a:p>
+          <a:p>
+            <a:pPr lvl="3"/>
+            <a:r>
+              <a:rPr lang="en-US" smtClean="0"/>
+              <a:t>Fourth level</a:t>
+            </a:r>
+          </a:p>
+          <a:p>
+            <a:pPr lvl="4"/>
+            <a:r>
+              <a:rPr lang="en-US" smtClean="0"/>
+              <a:t>Fifth level</a:t>
+            </a:r>
+            <a:endParaRPr lang="en-US"/>
+          </a:p>
+        </p:txBody>
+      </p:sp>
+      <p:sp>
+        <p:nvSpPr>
+          <p:cNvPr id="5" name="Text Placeholder 4"/>
+          <p:cNvSpPr>
+            <a:spLocks noGrp="1"/>
+          </p:cNvSpPr>
+          <p:nvPr>
+            <p:ph type="body" sz="quarter" idx="3"/>
+          </p:nvPr>
+        </p:nvSpPr>
+        <p:spPr>
+          <a:xfrm>
+            <a:off x="4645025" y="1535113"/>
+            <a:ext cx="4041775" cy="639762"/>
+          </a:xfrm>
+        </p:spPr>
+        <p:txBody>
+          <a:bodyPr anchor="b"/>
+          <a:lstStyle>
+            <a:lvl1pPr marL="0" indent="0">
+              <a:buNone/>
+              <a:defRPr sz="2400" b="1"/>
+            </a:lvl1pPr>
+            <a:lvl2pPr marL="457200" indent="0">
+              <a:buNone/>
+              <a:defRPr sz="2000" b="1"/>
+            </a:lvl2pPr>
+            <a:lvl3pPr marL="914400" indent="0">
+              <a:buNone/>
+              <a:defRPr sz="1800" b="1"/>
+            </a:lvl3pPr>
+            <a:lvl4pPr marL="1371600" indent="0">
+              <a:buNone/>
+              <a:defRPr sz="1600" b="1"/>
+            </a:lvl4pPr>
+            <a:lvl5pPr marL="1828800" indent="0">
+              <a:buNone/>
+              <a:defRPr sz="1600" b="1"/>
+            </a:lvl5pPr>
+            <a:lvl6pPr marL="2286000" indent="0">
+              <a:buNone/>
+              <a:defRPr sz="1600" b="1"/>
+            </a:lvl6pPr>
+            <a:lvl7pPr marL="2743200" indent="0">
+              <a:buNone/>
+              <a:defRPr sz="1600" b="1"/>
+            </a:lvl7pPr>
+            <a:lvl8pPr marL="3200400" indent="0">
+              <a:buNone/>
+              <a:defRPr sz="1600" b="1"/>
+            </a:lvl8pPr>
+            <a:lvl9pPr marL="3657600" indent="0">
+              <a:buNone/>
+              <a:defRPr sz="1600" b="1"/>
+            </a:lvl9pPr>
+          </a:lstStyle>
+          <a:p>
+            <a:pPr lvl="0"/>
+            <a:r>
+              <a:rPr lang="en-US" smtClean="0"/>
+              <a:t>Click to edit Master text styles</a:t>
+            </a:r>
+          </a:p>
+        </p:txBody>
+      </p:sp>
+      <p:sp>
+        <p:nvSpPr>
+          <p:cNvPr id="6" name="Content Placeholder 5"/>
+          <p:cNvSpPr>
+            <a:spLocks noGrp="1"/>
+          </p:cNvSpPr>
+          <p:nvPr>
+            <p:ph sz="quarter" idx="4"/>
+          </p:nvPr>
+        </p:nvSpPr>
+        <p:spPr>
+          <a:xfrm>
+            <a:off x="4645025" y="2174875"/>
+            <a:ext cx="4041775" cy="3951288"/>
+          </a:xfrm>
+        </p:spPr>
+        <p:txBody>
+          <a:bodyPr/>
+          <a:lstStyle>
+            <a:lvl1pPr>
+              <a:defRPr sz="2400"/>
+            </a:lvl1pPr>
+            <a:lvl2pPr>
+              <a:defRPr sz="2000"/>
+            </a:lvl2pPr>
+            <a:lvl3pPr>
+              <a:defRPr sz="1800"/>
+            </a:lvl3pPr>
+            <a:lvl4pPr>
+              <a:defRPr sz="1600"/>
+            </a:lvl4pPr>
+            <a:lvl5pPr>
+              <a:defRPr sz="1600"/>
+            </a:lvl5pPr>
+            <a:lvl6pPr>
+              <a:defRPr sz="1600"/>
+            </a:lvl6pPr>
+            <a:lvl7pPr>
+              <a:defRPr sz="1600"/>
+            </a:lvl7pPr>
+            <a:lvl8pPr>
+              <a:defRPr sz="1600"/>
+            </a:lvl8pPr>
+            <a:lvl9pPr>
+              <a:defRPr sz="1600"/>
+            </a:lvl9pPr>
+          </a:lstStyle>
+          <a:p>
+            <a:pPr lvl="0"/>
+            <a:r>
+              <a:rPr lang="en-US" smtClean="0"/>
+              <a:t>Click to edit Master text styles</a:t>
+            </a:r>
+          </a:p>
+          <a:p>
+            <a:pPr lvl="1"/>
+            <a:r>
+              <a:rPr lang="en-US" smtClean="0"/>
+              <a:t>Second level</a:t>
+            </a:r>
+          </a:p>
+          <a:p>
+            <a:pPr lvl="2"/>
+            <a:r>
+              <a:rPr lang="en-US" smtClean="0"/>
+              <a:t>Third level</a:t>
+            </a:r>
+          </a:p>
+          <a:p>
+            <a:pPr lvl="3"/>
+            <a:r>
+              <a:rPr lang="en-US" smtClean="0"/>
+              <a:t>Fourth level</a:t>
+            </a:r>
+          </a:p>
+          <a:p>
+            <a:pPr lvl="4"/>
+            <a:r>
+              <a:rPr lang="en-US" smtClean="0"/>
+              <a:t>Fifth level</a:t>
+            </a:r>
+            <a:endParaRPr lang="en-US"/>
+          </a:p>
+        </p:txBody>
+      </p:sp>
+      <p:sp>
+        <p:nvSpPr>
+          <p:cNvPr id="7" name="Date Placeholder 6"/>
+          <p:cNvSpPr>
+            <a:spLocks noGrp="1"/>
+          </p:cNvSpPr>
+          <p:nvPr>
+            <p:ph type="dt" sz="half" idx="10"/>
+          </p:nvPr>
+        </p:nvSpPr>
+        <p:spPr/>
+        <p:txBody>
+          <a:bodyPr/>
+          <a:lstStyle/>
+          <a:p>
+            <a:pPr algn="l" rtl="0"/>
+            <a:fld id="{E5B1AC9D-7C8A-4BB3-B152-489FC1CA0160}" type="datetimeFigureOut">
+              <a:rPr lang="en-US" sz="1200" kern="1200">
+                <a:solidFill>
+                  <a:prstClr val="white">
+                    <a:tint val="75000"/>
+                  </a:prstClr>
+                </a:solidFill>
+                <a:latin typeface="Calibri"/>
+                <a:ea typeface="+mn-ea"/>
+                <a:cs typeface="+mn-cs"/>
+              </a:rPr>
+              <a:pPr algn="l" rtl="0"/>
+              <a:t>3/12/2009</a:t>
+            </a:fld>
+            <a:endParaRPr lang="en-US" sz="1200" kern="1200">
+              <a:solidFill>
+                <a:prstClr val="white">
+                  <a:tint val="75000"/>
+                </a:prstClr>
+              </a:solidFill>
+              <a:latin typeface="Calibri"/>
+              <a:ea typeface="+mn-ea"/>
+              <a:cs typeface="+mn-cs"/>
+            </a:endParaRPr>
+          </a:p>
+        </p:txBody>
+      </p:sp>
+      <p:sp>
+        <p:nvSpPr>
+          <p:cNvPr id="8" name="Footer Placeholder 7"/>
+          <p:cNvSpPr>
+            <a:spLocks noGrp="1"/>
+          </p:cNvSpPr>
+          <p:nvPr>
+            <p:ph type="ftr" sz="quarter" idx="11"/>
+          </p:nvPr>
+        </p:nvSpPr>
+        <p:spPr/>
+        <p:txBody>
+          <a:bodyPr/>
+          <a:lstStyle/>
+          <a:p>
+            <a:pPr algn="ctr" rtl="0"/>
+            <a:endParaRPr lang="en-US" sz="1200" kern="1200">
+              <a:solidFill>
+                <a:prstClr val="white">
+                  <a:tint val="75000"/>
+                </a:prstClr>
+              </a:solidFill>
+              <a:latin typeface="Calibri"/>
+              <a:ea typeface="+mn-ea"/>
+              <a:cs typeface="+mn-cs"/>
+            </a:endParaRPr>
+          </a:p>
+        </p:txBody>
+      </p:sp>
+      <p:sp>
+        <p:nvSpPr>
+          <p:cNvPr id="9" name="Slide Number Placeholder 8"/>
+          <p:cNvSpPr>
+            <a:spLocks noGrp="1"/>
+          </p:cNvSpPr>
+          <p:nvPr>
+            <p:ph type="sldNum" sz="quarter" idx="12"/>
+          </p:nvPr>
+        </p:nvSpPr>
+        <p:spPr/>
+        <p:txBody>
+          <a:bodyPr/>
+          <a:lstStyle/>
+          <a:p>
+            <a:pPr algn="r" rtl="0"/>
+            <a:fld id="{37093969-7AAB-46EA-AA3B-E867A8062A99}" type="slidenum">
+              <a:rPr lang="en-US" sz="1200" kern="1200">
+                <a:solidFill>
+                  <a:prstClr val="white">
+                    <a:tint val="75000"/>
+                  </a:prstClr>
+                </a:solidFill>
+                <a:latin typeface="Calibri"/>
+                <a:ea typeface="+mn-ea"/>
+                <a:cs typeface="+mn-cs"/>
+              </a:rPr>
+              <a:pPr algn="r" rtl="0"/>
+              <a:t>‹#›</a:t>
+            </a:fld>
+            <a:endParaRPr lang="en-US" sz="1200" kern="1200">
+              <a:solidFill>
+                <a:prstClr val="white">
+                  <a:tint val="75000"/>
+                </a:prstClr>
+              </a:solidFill>
+              <a:latin typeface="Calibri"/>
+              <a:ea typeface="+mn-ea"/>
+              <a:cs typeface="+mn-cs"/>
+            </a:endParaRPr>
+          </a:p>
+        </p:txBody>
+      </p:sp>
+    </p:spTree>
+  </p:cSld>
+  <p:clrMapOvr>
+    <a:masterClrMapping/>
+  </p:clrMapOvr>
+</p:sldLayout>
+</file>
+
+<file path=ppt/slideLayouts/slideLayout39.xml><?xml version="1.0" encoding="utf-8"?>
+<p:sldLayout xmlns:a="http://schemas.openxmlformats.org/drawingml/2006/main" xmlns:r="http://schemas.openxmlformats.org/officeDocument/2006/relationships" xmlns:p="http://schemas.openxmlformats.org/presentationml/2006/main" type="titleOnly" preserve="1">
+  <p:cSld name="Title Only">
+    <p:spTree>
+      <p:nvGrpSpPr>
+        <p:cNvPr id="1" name=""/>
+        <p:cNvGrpSpPr/>
+        <p:nvPr/>
+      </p:nvGrpSpPr>
+      <p:grpSpPr>
+        <a:xfrm>
+          <a:off x="0" y="0"/>
+          <a:ext cx="0" cy="0"/>
+          <a:chOff x="0" y="0"/>
+          <a:chExt cx="0" cy="0"/>
+        </a:xfrm>
+      </p:grpSpPr>
+      <p:sp>
+        <p:nvSpPr>
+          <p:cNvPr id="2" name="Title 1"/>
+          <p:cNvSpPr>
+            <a:spLocks noGrp="1"/>
+          </p:cNvSpPr>
+          <p:nvPr>
+            <p:ph type="title"/>
+          </p:nvPr>
+        </p:nvSpPr>
+        <p:spPr/>
+        <p:txBody>
+          <a:bodyPr/>
+          <a:lstStyle/>
+          <a:p>
+            <a:r>
+              <a:rPr lang="en-US" smtClean="0"/>
+              <a:t>Click to edit Master title style</a:t>
+            </a:r>
+            <a:endParaRPr lang="en-US"/>
+          </a:p>
+        </p:txBody>
+      </p:sp>
+      <p:sp>
+        <p:nvSpPr>
+          <p:cNvPr id="3" name="Date Placeholder 2"/>
+          <p:cNvSpPr>
+            <a:spLocks noGrp="1"/>
+          </p:cNvSpPr>
+          <p:nvPr>
+            <p:ph type="dt" sz="half" idx="10"/>
+          </p:nvPr>
+        </p:nvSpPr>
+        <p:spPr/>
+        <p:txBody>
+          <a:bodyPr/>
+          <a:lstStyle/>
+          <a:p>
+            <a:pPr algn="l" rtl="0"/>
+            <a:fld id="{E5B1AC9D-7C8A-4BB3-B152-489FC1CA0160}" type="datetimeFigureOut">
+              <a:rPr lang="en-US" sz="1200" kern="1200">
+                <a:solidFill>
+                  <a:prstClr val="white">
+                    <a:tint val="75000"/>
+                  </a:prstClr>
+                </a:solidFill>
+                <a:latin typeface="Calibri"/>
+                <a:ea typeface="+mn-ea"/>
+                <a:cs typeface="+mn-cs"/>
+              </a:rPr>
+              <a:pPr algn="l" rtl="0"/>
+              <a:t>3/12/2009</a:t>
+            </a:fld>
+            <a:endParaRPr lang="en-US" sz="1200" kern="1200">
+              <a:solidFill>
+                <a:prstClr val="white">
+                  <a:tint val="75000"/>
+                </a:prstClr>
+              </a:solidFill>
+              <a:latin typeface="Calibri"/>
+              <a:ea typeface="+mn-ea"/>
+              <a:cs typeface="+mn-cs"/>
+            </a:endParaRPr>
+          </a:p>
+        </p:txBody>
+      </p:sp>
+      <p:sp>
+        <p:nvSpPr>
+          <p:cNvPr id="4" name="Footer Placeholder 3"/>
+          <p:cNvSpPr>
+            <a:spLocks noGrp="1"/>
+          </p:cNvSpPr>
+          <p:nvPr>
+            <p:ph type="ftr" sz="quarter" idx="11"/>
+          </p:nvPr>
+        </p:nvSpPr>
+        <p:spPr/>
+        <p:txBody>
+          <a:bodyPr/>
+          <a:lstStyle/>
+          <a:p>
+            <a:pPr algn="ctr" rtl="0"/>
+            <a:endParaRPr lang="en-US" sz="1200" kern="1200">
+              <a:solidFill>
+                <a:prstClr val="white">
+                  <a:tint val="75000"/>
+                </a:prstClr>
+              </a:solidFill>
+              <a:latin typeface="Calibri"/>
+              <a:ea typeface="+mn-ea"/>
+              <a:cs typeface="+mn-cs"/>
+            </a:endParaRPr>
+          </a:p>
+        </p:txBody>
+      </p:sp>
+      <p:sp>
+        <p:nvSpPr>
+          <p:cNvPr id="5" name="Slide Number Placeholder 4"/>
+          <p:cNvSpPr>
+            <a:spLocks noGrp="1"/>
+          </p:cNvSpPr>
+          <p:nvPr>
+            <p:ph type="sldNum" sz="quarter" idx="12"/>
+          </p:nvPr>
+        </p:nvSpPr>
+        <p:spPr/>
+        <p:txBody>
+          <a:bodyPr/>
+          <a:lstStyle/>
+          <a:p>
+            <a:pPr algn="r" rtl="0"/>
+            <a:fld id="{37093969-7AAB-46EA-AA3B-E867A8062A99}" type="slidenum">
+              <a:rPr lang="en-US" sz="1200" kern="1200">
+                <a:solidFill>
+                  <a:prstClr val="white">
+                    <a:tint val="75000"/>
+                  </a:prstClr>
+                </a:solidFill>
+                <a:latin typeface="Calibri"/>
+                <a:ea typeface="+mn-ea"/>
+                <a:cs typeface="+mn-cs"/>
+              </a:rPr>
+              <a:pPr algn="r" rtl="0"/>
+              <a:t>‹#›</a:t>
+            </a:fld>
+            <a:endParaRPr lang="en-US" sz="1200" kern="1200">
+              <a:solidFill>
+                <a:prstClr val="white">
+                  <a:tint val="75000"/>
+                </a:prstClr>
+              </a:solidFill>
+              <a:latin typeface="Calibri"/>
+              <a:ea typeface="+mn-ea"/>
+              <a:cs typeface="+mn-cs"/>
+            </a:endParaRPr>
+          </a:p>
+        </p:txBody>
+      </p:sp>
+    </p:spTree>
+  </p:cSld>
+  <p:clrMapOvr>
+    <a:masterClrMapping/>
+  </p:clrMapOvr>
+</p:sldLayout>
+</file>
+
+<file path=ppt/slideLayouts/slideLayout4.xml><?xml version="1.0" encoding="utf-8"?>
+<p:sldLayout xmlns:a="http://schemas.openxmlformats.org/drawingml/2006/main" xmlns:r="http://schemas.openxmlformats.org/officeDocument/2006/relationships" xmlns:p="http://schemas.openxmlformats.org/presentationml/2006/main" type="twoObj" preserve="1">
+  <p:cSld name="Two Content">
+    <p:spTree>
+      <p:nvGrpSpPr>
+        <p:cNvPr id="1" name=""/>
+        <p:cNvGrpSpPr/>
+        <p:nvPr/>
+      </p:nvGrpSpPr>
+      <p:grpSpPr>
+        <a:xfrm>
+          <a:off x="0" y="0"/>
+          <a:ext cx="0" cy="0"/>
+          <a:chOff x="0" y="0"/>
+          <a:chExt cx="0" cy="0"/>
+        </a:xfrm>
+      </p:grpSpPr>
+      <p:sp>
+        <p:nvSpPr>
+          <p:cNvPr id="2" name="Title 1"/>
+          <p:cNvSpPr>
+            <a:spLocks noGrp="1"/>
+          </p:cNvSpPr>
+          <p:nvPr>
+            <p:ph type="title"/>
+          </p:nvPr>
+        </p:nvSpPr>
+        <p:spPr/>
+        <p:txBody>
+          <a:bodyPr/>
+          <a:lstStyle/>
+          <a:p>
+            <a:r>
+              <a:rPr lang="en-US" smtClean="0"/>
+              <a:t>Click to edit Master title style</a:t>
+            </a:r>
+            <a:endParaRPr lang="en-US"/>
+          </a:p>
+        </p:txBody>
+      </p:sp>
+      <p:sp>
+        <p:nvSpPr>
+          <p:cNvPr id="3" name="Content Placeholder 2"/>
+          <p:cNvSpPr>
+            <a:spLocks noGrp="1"/>
+          </p:cNvSpPr>
+          <p:nvPr>
+            <p:ph sz="half" idx="1"/>
+          </p:nvPr>
+        </p:nvSpPr>
+        <p:spPr>
+          <a:xfrm>
+            <a:off x="457200" y="1600200"/>
+            <a:ext cx="4038600" cy="4525963"/>
+          </a:xfrm>
+        </p:spPr>
+        <p:txBody>
+          <a:bodyPr/>
+          <a:lstStyle>
+            <a:lvl1pPr>
+              <a:defRPr sz="2800"/>
+            </a:lvl1pPr>
+            <a:lvl2pPr>
+              <a:defRPr sz="2400"/>
+            </a:lvl2pPr>
+            <a:lvl3pPr>
+              <a:defRPr sz="2000"/>
+            </a:lvl3pPr>
+            <a:lvl4pPr>
+              <a:defRPr sz="1800"/>
+            </a:lvl4pPr>
+            <a:lvl5pPr>
+              <a:defRPr sz="1800"/>
+            </a:lvl5pPr>
+            <a:lvl6pPr>
+              <a:defRPr sz="1800"/>
+            </a:lvl6pPr>
+            <a:lvl7pPr>
+              <a:defRPr sz="1800"/>
+            </a:lvl7pPr>
+            <a:lvl8pPr>
+              <a:defRPr sz="1800"/>
+            </a:lvl8pPr>
+            <a:lvl9pPr>
+              <a:defRPr sz="1800"/>
+            </a:lvl9pPr>
+          </a:lstStyle>
+          <a:p>
+            <a:pPr lvl="0"/>
+            <a:r>
+              <a:rPr lang="en-US" smtClean="0"/>
+              <a:t>Click to edit Master text styles</a:t>
+            </a:r>
+          </a:p>
+          <a:p>
+            <a:pPr lvl="1"/>
+            <a:r>
+              <a:rPr lang="en-US" smtClean="0"/>
+              <a:t>Second level</a:t>
+            </a:r>
+          </a:p>
+          <a:p>
+            <a:pPr lvl="2"/>
+            <a:r>
+              <a:rPr lang="en-US" smtClean="0"/>
+              <a:t>Third level</a:t>
+            </a:r>
+          </a:p>
+          <a:p>
+            <a:pPr lvl="3"/>
+            <a:r>
+              <a:rPr lang="en-US" smtClean="0"/>
+              <a:t>Fourth level</a:t>
+            </a:r>
+          </a:p>
+          <a:p>
+            <a:pPr lvl="4"/>
+            <a:r>
+              <a:rPr lang="en-US" smtClean="0"/>
+              <a:t>Fifth level</a:t>
+            </a:r>
+            <a:endParaRPr lang="en-US"/>
+          </a:p>
+        </p:txBody>
+      </p:sp>
+      <p:sp>
+        <p:nvSpPr>
+          <p:cNvPr id="4" name="Content Placeholder 3"/>
+          <p:cNvSpPr>
+            <a:spLocks noGrp="1"/>
+          </p:cNvSpPr>
+          <p:nvPr>
+            <p:ph sz="half" idx="2"/>
+          </p:nvPr>
+        </p:nvSpPr>
+        <p:spPr>
+          <a:xfrm>
+            <a:off x="4648200" y="1600200"/>
+            <a:ext cx="4038600" cy="4525963"/>
+          </a:xfrm>
+        </p:spPr>
+        <p:txBody>
+          <a:bodyPr/>
+          <a:lstStyle>
+            <a:lvl1pPr>
+              <a:defRPr sz="2800"/>
+            </a:lvl1pPr>
+            <a:lvl2pPr>
+              <a:defRPr sz="2400"/>
+            </a:lvl2pPr>
+            <a:lvl3pPr>
+              <a:defRPr sz="2000"/>
+            </a:lvl3pPr>
+            <a:lvl4pPr>
+              <a:defRPr sz="1800"/>
+            </a:lvl4pPr>
+            <a:lvl5pPr>
+              <a:defRPr sz="1800"/>
+            </a:lvl5pPr>
+            <a:lvl6pPr>
+              <a:defRPr sz="1800"/>
+            </a:lvl6pPr>
+            <a:lvl7pPr>
+              <a:defRPr sz="1800"/>
+            </a:lvl7pPr>
+            <a:lvl8pPr>
+              <a:defRPr sz="1800"/>
+            </a:lvl8pPr>
+            <a:lvl9pPr>
+              <a:defRPr sz="1800"/>
+            </a:lvl9pPr>
+          </a:lstStyle>
+          <a:p>
+            <a:pPr lvl="0"/>
+            <a:r>
+              <a:rPr lang="en-US" smtClean="0"/>
+              <a:t>Click to edit Master text styles</a:t>
+            </a:r>
+          </a:p>
+          <a:p>
+            <a:pPr lvl="1"/>
+            <a:r>
+              <a:rPr lang="en-US" smtClean="0"/>
+              <a:t>Second level</a:t>
+            </a:r>
+          </a:p>
+          <a:p>
+            <a:pPr lvl="2"/>
+            <a:r>
+              <a:rPr lang="en-US" smtClean="0"/>
+              <a:t>Third level</a:t>
+            </a:r>
+          </a:p>
+          <a:p>
+            <a:pPr lvl="3"/>
+            <a:r>
+              <a:rPr lang="en-US" smtClean="0"/>
+              <a:t>Fourth level</a:t>
+            </a:r>
+          </a:p>
+          <a:p>
+            <a:pPr lvl="4"/>
+            <a:r>
+              <a:rPr lang="en-US" smtClean="0"/>
+              <a:t>Fifth level</a:t>
+            </a:r>
+            <a:endParaRPr lang="en-US"/>
+          </a:p>
+        </p:txBody>
+      </p:sp>
+      <p:sp>
+        <p:nvSpPr>
+          <p:cNvPr id="5" name="Date Placeholder 4"/>
+          <p:cNvSpPr>
+            <a:spLocks noGrp="1"/>
+          </p:cNvSpPr>
+          <p:nvPr>
+            <p:ph type="dt" sz="half" idx="10"/>
+          </p:nvPr>
+        </p:nvSpPr>
+        <p:spPr/>
+        <p:txBody>
+          <a:bodyPr/>
+          <a:lstStyle/>
+          <a:p>
             <a:fld id="{3541C51D-28AE-4E03-B530-D8520D9050CD}" type="datetimeFigureOut">
               <a:rPr lang="en-US" smtClean="0"/>
               <a:pPr/>
@@ -7293,6 +9051,1206 @@
               <a:t>‹#›</a:t>
             </a:fld>
             <a:endParaRPr lang="en-US"/>
+          </a:p>
+        </p:txBody>
+      </p:sp>
+    </p:spTree>
+  </p:cSld>
+  <p:clrMapOvr>
+    <a:masterClrMapping/>
+  </p:clrMapOvr>
+</p:sldLayout>
+</file>
+
+<file path=ppt/slideLayouts/slideLayout40.xml><?xml version="1.0" encoding="utf-8"?>
+<p:sldLayout xmlns:a="http://schemas.openxmlformats.org/drawingml/2006/main" xmlns:r="http://schemas.openxmlformats.org/officeDocument/2006/relationships" xmlns:p="http://schemas.openxmlformats.org/presentationml/2006/main" type="blank" preserve="1">
+  <p:cSld name="Blank">
+    <p:spTree>
+      <p:nvGrpSpPr>
+        <p:cNvPr id="1" name=""/>
+        <p:cNvGrpSpPr/>
+        <p:nvPr/>
+      </p:nvGrpSpPr>
+      <p:grpSpPr>
+        <a:xfrm>
+          <a:off x="0" y="0"/>
+          <a:ext cx="0" cy="0"/>
+          <a:chOff x="0" y="0"/>
+          <a:chExt cx="0" cy="0"/>
+        </a:xfrm>
+      </p:grpSpPr>
+      <p:sp>
+        <p:nvSpPr>
+          <p:cNvPr id="2" name="Date Placeholder 1"/>
+          <p:cNvSpPr>
+            <a:spLocks noGrp="1"/>
+          </p:cNvSpPr>
+          <p:nvPr>
+            <p:ph type="dt" sz="half" idx="10"/>
+          </p:nvPr>
+        </p:nvSpPr>
+        <p:spPr/>
+        <p:txBody>
+          <a:bodyPr/>
+          <a:lstStyle/>
+          <a:p>
+            <a:pPr algn="l" rtl="0"/>
+            <a:fld id="{E5B1AC9D-7C8A-4BB3-B152-489FC1CA0160}" type="datetimeFigureOut">
+              <a:rPr lang="en-US" sz="1200" kern="1200">
+                <a:solidFill>
+                  <a:prstClr val="white">
+                    <a:tint val="75000"/>
+                  </a:prstClr>
+                </a:solidFill>
+                <a:latin typeface="Calibri"/>
+                <a:ea typeface="+mn-ea"/>
+                <a:cs typeface="+mn-cs"/>
+              </a:rPr>
+              <a:pPr algn="l" rtl="0"/>
+              <a:t>3/12/2009</a:t>
+            </a:fld>
+            <a:endParaRPr lang="en-US" sz="1200" kern="1200">
+              <a:solidFill>
+                <a:prstClr val="white">
+                  <a:tint val="75000"/>
+                </a:prstClr>
+              </a:solidFill>
+              <a:latin typeface="Calibri"/>
+              <a:ea typeface="+mn-ea"/>
+              <a:cs typeface="+mn-cs"/>
+            </a:endParaRPr>
+          </a:p>
+        </p:txBody>
+      </p:sp>
+      <p:sp>
+        <p:nvSpPr>
+          <p:cNvPr id="3" name="Footer Placeholder 2"/>
+          <p:cNvSpPr>
+            <a:spLocks noGrp="1"/>
+          </p:cNvSpPr>
+          <p:nvPr>
+            <p:ph type="ftr" sz="quarter" idx="11"/>
+          </p:nvPr>
+        </p:nvSpPr>
+        <p:spPr/>
+        <p:txBody>
+          <a:bodyPr/>
+          <a:lstStyle/>
+          <a:p>
+            <a:pPr algn="ctr" rtl="0"/>
+            <a:endParaRPr lang="en-US" sz="1200" kern="1200">
+              <a:solidFill>
+                <a:prstClr val="white">
+                  <a:tint val="75000"/>
+                </a:prstClr>
+              </a:solidFill>
+              <a:latin typeface="Calibri"/>
+              <a:ea typeface="+mn-ea"/>
+              <a:cs typeface="+mn-cs"/>
+            </a:endParaRPr>
+          </a:p>
+        </p:txBody>
+      </p:sp>
+      <p:sp>
+        <p:nvSpPr>
+          <p:cNvPr id="4" name="Slide Number Placeholder 3"/>
+          <p:cNvSpPr>
+            <a:spLocks noGrp="1"/>
+          </p:cNvSpPr>
+          <p:nvPr>
+            <p:ph type="sldNum" sz="quarter" idx="12"/>
+          </p:nvPr>
+        </p:nvSpPr>
+        <p:spPr/>
+        <p:txBody>
+          <a:bodyPr/>
+          <a:lstStyle/>
+          <a:p>
+            <a:pPr algn="r" rtl="0"/>
+            <a:fld id="{37093969-7AAB-46EA-AA3B-E867A8062A99}" type="slidenum">
+              <a:rPr lang="en-US" sz="1200" kern="1200">
+                <a:solidFill>
+                  <a:prstClr val="white">
+                    <a:tint val="75000"/>
+                  </a:prstClr>
+                </a:solidFill>
+                <a:latin typeface="Calibri"/>
+                <a:ea typeface="+mn-ea"/>
+                <a:cs typeface="+mn-cs"/>
+              </a:rPr>
+              <a:pPr algn="r" rtl="0"/>
+              <a:t>‹#›</a:t>
+            </a:fld>
+            <a:endParaRPr lang="en-US" sz="1200" kern="1200">
+              <a:solidFill>
+                <a:prstClr val="white">
+                  <a:tint val="75000"/>
+                </a:prstClr>
+              </a:solidFill>
+              <a:latin typeface="Calibri"/>
+              <a:ea typeface="+mn-ea"/>
+              <a:cs typeface="+mn-cs"/>
+            </a:endParaRPr>
+          </a:p>
+        </p:txBody>
+      </p:sp>
+    </p:spTree>
+  </p:cSld>
+  <p:clrMapOvr>
+    <a:masterClrMapping/>
+  </p:clrMapOvr>
+</p:sldLayout>
+</file>
+
+<file path=ppt/slideLayouts/slideLayout41.xml><?xml version="1.0" encoding="utf-8"?>
+<p:sldLayout xmlns:a="http://schemas.openxmlformats.org/drawingml/2006/main" xmlns:r="http://schemas.openxmlformats.org/officeDocument/2006/relationships" xmlns:p="http://schemas.openxmlformats.org/presentationml/2006/main" type="objTx" preserve="1">
+  <p:cSld name="Content with Caption">
+    <p:spTree>
+      <p:nvGrpSpPr>
+        <p:cNvPr id="1" name=""/>
+        <p:cNvGrpSpPr/>
+        <p:nvPr/>
+      </p:nvGrpSpPr>
+      <p:grpSpPr>
+        <a:xfrm>
+          <a:off x="0" y="0"/>
+          <a:ext cx="0" cy="0"/>
+          <a:chOff x="0" y="0"/>
+          <a:chExt cx="0" cy="0"/>
+        </a:xfrm>
+      </p:grpSpPr>
+      <p:sp>
+        <p:nvSpPr>
+          <p:cNvPr id="2" name="Title 1"/>
+          <p:cNvSpPr>
+            <a:spLocks noGrp="1"/>
+          </p:cNvSpPr>
+          <p:nvPr>
+            <p:ph type="title"/>
+          </p:nvPr>
+        </p:nvSpPr>
+        <p:spPr>
+          <a:xfrm>
+            <a:off x="457200" y="273050"/>
+            <a:ext cx="3008313" cy="1162050"/>
+          </a:xfrm>
+        </p:spPr>
+        <p:txBody>
+          <a:bodyPr anchor="b"/>
+          <a:lstStyle>
+            <a:lvl1pPr algn="l">
+              <a:defRPr sz="2000" b="1"/>
+            </a:lvl1pPr>
+          </a:lstStyle>
+          <a:p>
+            <a:r>
+              <a:rPr lang="en-US" smtClean="0"/>
+              <a:t>Click to edit Master title style</a:t>
+            </a:r>
+            <a:endParaRPr lang="en-US"/>
+          </a:p>
+        </p:txBody>
+      </p:sp>
+      <p:sp>
+        <p:nvSpPr>
+          <p:cNvPr id="3" name="Content Placeholder 2"/>
+          <p:cNvSpPr>
+            <a:spLocks noGrp="1"/>
+          </p:cNvSpPr>
+          <p:nvPr>
+            <p:ph idx="1"/>
+          </p:nvPr>
+        </p:nvSpPr>
+        <p:spPr>
+          <a:xfrm>
+            <a:off x="3575050" y="273050"/>
+            <a:ext cx="5111750" cy="5853113"/>
+          </a:xfrm>
+        </p:spPr>
+        <p:txBody>
+          <a:bodyPr/>
+          <a:lstStyle>
+            <a:lvl1pPr>
+              <a:defRPr sz="3200"/>
+            </a:lvl1pPr>
+            <a:lvl2pPr>
+              <a:defRPr sz="2800"/>
+            </a:lvl2pPr>
+            <a:lvl3pPr>
+              <a:defRPr sz="2400"/>
+            </a:lvl3pPr>
+            <a:lvl4pPr>
+              <a:defRPr sz="2000"/>
+            </a:lvl4pPr>
+            <a:lvl5pPr>
+              <a:defRPr sz="2000"/>
+            </a:lvl5pPr>
+            <a:lvl6pPr>
+              <a:defRPr sz="2000"/>
+            </a:lvl6pPr>
+            <a:lvl7pPr>
+              <a:defRPr sz="2000"/>
+            </a:lvl7pPr>
+            <a:lvl8pPr>
+              <a:defRPr sz="2000"/>
+            </a:lvl8pPr>
+            <a:lvl9pPr>
+              <a:defRPr sz="2000"/>
+            </a:lvl9pPr>
+          </a:lstStyle>
+          <a:p>
+            <a:pPr lvl="0"/>
+            <a:r>
+              <a:rPr lang="en-US" smtClean="0"/>
+              <a:t>Click to edit Master text styles</a:t>
+            </a:r>
+          </a:p>
+          <a:p>
+            <a:pPr lvl="1"/>
+            <a:r>
+              <a:rPr lang="en-US" smtClean="0"/>
+              <a:t>Second level</a:t>
+            </a:r>
+          </a:p>
+          <a:p>
+            <a:pPr lvl="2"/>
+            <a:r>
+              <a:rPr lang="en-US" smtClean="0"/>
+              <a:t>Third level</a:t>
+            </a:r>
+          </a:p>
+          <a:p>
+            <a:pPr lvl="3"/>
+            <a:r>
+              <a:rPr lang="en-US" smtClean="0"/>
+              <a:t>Fourth level</a:t>
+            </a:r>
+          </a:p>
+          <a:p>
+            <a:pPr lvl="4"/>
+            <a:r>
+              <a:rPr lang="en-US" smtClean="0"/>
+              <a:t>Fifth level</a:t>
+            </a:r>
+            <a:endParaRPr lang="en-US"/>
+          </a:p>
+        </p:txBody>
+      </p:sp>
+      <p:sp>
+        <p:nvSpPr>
+          <p:cNvPr id="4" name="Text Placeholder 3"/>
+          <p:cNvSpPr>
+            <a:spLocks noGrp="1"/>
+          </p:cNvSpPr>
+          <p:nvPr>
+            <p:ph type="body" sz="half" idx="2"/>
+          </p:nvPr>
+        </p:nvSpPr>
+        <p:spPr>
+          <a:xfrm>
+            <a:off x="457200" y="1435100"/>
+            <a:ext cx="3008313" cy="4691063"/>
+          </a:xfrm>
+        </p:spPr>
+        <p:txBody>
+          <a:bodyPr/>
+          <a:lstStyle>
+            <a:lvl1pPr marL="0" indent="0">
+              <a:buNone/>
+              <a:defRPr sz="1400"/>
+            </a:lvl1pPr>
+            <a:lvl2pPr marL="457200" indent="0">
+              <a:buNone/>
+              <a:defRPr sz="1200"/>
+            </a:lvl2pPr>
+            <a:lvl3pPr marL="914400" indent="0">
+              <a:buNone/>
+              <a:defRPr sz="1000"/>
+            </a:lvl3pPr>
+            <a:lvl4pPr marL="1371600" indent="0">
+              <a:buNone/>
+              <a:defRPr sz="900"/>
+            </a:lvl4pPr>
+            <a:lvl5pPr marL="1828800" indent="0">
+              <a:buNone/>
+              <a:defRPr sz="900"/>
+            </a:lvl5pPr>
+            <a:lvl6pPr marL="2286000" indent="0">
+              <a:buNone/>
+              <a:defRPr sz="900"/>
+            </a:lvl6pPr>
+            <a:lvl7pPr marL="2743200" indent="0">
+              <a:buNone/>
+              <a:defRPr sz="900"/>
+            </a:lvl7pPr>
+            <a:lvl8pPr marL="3200400" indent="0">
+              <a:buNone/>
+              <a:defRPr sz="900"/>
+            </a:lvl8pPr>
+            <a:lvl9pPr marL="3657600" indent="0">
+              <a:buNone/>
+              <a:defRPr sz="900"/>
+            </a:lvl9pPr>
+          </a:lstStyle>
+          <a:p>
+            <a:pPr lvl="0"/>
+            <a:r>
+              <a:rPr lang="en-US" smtClean="0"/>
+              <a:t>Click to edit Master text styles</a:t>
+            </a:r>
+          </a:p>
+        </p:txBody>
+      </p:sp>
+      <p:sp>
+        <p:nvSpPr>
+          <p:cNvPr id="5" name="Date Placeholder 4"/>
+          <p:cNvSpPr>
+            <a:spLocks noGrp="1"/>
+          </p:cNvSpPr>
+          <p:nvPr>
+            <p:ph type="dt" sz="half" idx="10"/>
+          </p:nvPr>
+        </p:nvSpPr>
+        <p:spPr/>
+        <p:txBody>
+          <a:bodyPr/>
+          <a:lstStyle/>
+          <a:p>
+            <a:pPr algn="l" rtl="0"/>
+            <a:fld id="{E5B1AC9D-7C8A-4BB3-B152-489FC1CA0160}" type="datetimeFigureOut">
+              <a:rPr lang="en-US" sz="1200" kern="1200">
+                <a:solidFill>
+                  <a:prstClr val="white">
+                    <a:tint val="75000"/>
+                  </a:prstClr>
+                </a:solidFill>
+                <a:latin typeface="Calibri"/>
+                <a:ea typeface="+mn-ea"/>
+                <a:cs typeface="+mn-cs"/>
+              </a:rPr>
+              <a:pPr algn="l" rtl="0"/>
+              <a:t>3/12/2009</a:t>
+            </a:fld>
+            <a:endParaRPr lang="en-US" sz="1200" kern="1200">
+              <a:solidFill>
+                <a:prstClr val="white">
+                  <a:tint val="75000"/>
+                </a:prstClr>
+              </a:solidFill>
+              <a:latin typeface="Calibri"/>
+              <a:ea typeface="+mn-ea"/>
+              <a:cs typeface="+mn-cs"/>
+            </a:endParaRPr>
+          </a:p>
+        </p:txBody>
+      </p:sp>
+      <p:sp>
+        <p:nvSpPr>
+          <p:cNvPr id="6" name="Footer Placeholder 5"/>
+          <p:cNvSpPr>
+            <a:spLocks noGrp="1"/>
+          </p:cNvSpPr>
+          <p:nvPr>
+            <p:ph type="ftr" sz="quarter" idx="11"/>
+          </p:nvPr>
+        </p:nvSpPr>
+        <p:spPr/>
+        <p:txBody>
+          <a:bodyPr/>
+          <a:lstStyle/>
+          <a:p>
+            <a:pPr algn="ctr" rtl="0"/>
+            <a:endParaRPr lang="en-US" sz="1200" kern="1200">
+              <a:solidFill>
+                <a:prstClr val="white">
+                  <a:tint val="75000"/>
+                </a:prstClr>
+              </a:solidFill>
+              <a:latin typeface="Calibri"/>
+              <a:ea typeface="+mn-ea"/>
+              <a:cs typeface="+mn-cs"/>
+            </a:endParaRPr>
+          </a:p>
+        </p:txBody>
+      </p:sp>
+      <p:sp>
+        <p:nvSpPr>
+          <p:cNvPr id="7" name="Slide Number Placeholder 6"/>
+          <p:cNvSpPr>
+            <a:spLocks noGrp="1"/>
+          </p:cNvSpPr>
+          <p:nvPr>
+            <p:ph type="sldNum" sz="quarter" idx="12"/>
+          </p:nvPr>
+        </p:nvSpPr>
+        <p:spPr/>
+        <p:txBody>
+          <a:bodyPr/>
+          <a:lstStyle/>
+          <a:p>
+            <a:pPr algn="r" rtl="0"/>
+            <a:fld id="{37093969-7AAB-46EA-AA3B-E867A8062A99}" type="slidenum">
+              <a:rPr lang="en-US" sz="1200" kern="1200">
+                <a:solidFill>
+                  <a:prstClr val="white">
+                    <a:tint val="75000"/>
+                  </a:prstClr>
+                </a:solidFill>
+                <a:latin typeface="Calibri"/>
+                <a:ea typeface="+mn-ea"/>
+                <a:cs typeface="+mn-cs"/>
+              </a:rPr>
+              <a:pPr algn="r" rtl="0"/>
+              <a:t>‹#›</a:t>
+            </a:fld>
+            <a:endParaRPr lang="en-US" sz="1200" kern="1200">
+              <a:solidFill>
+                <a:prstClr val="white">
+                  <a:tint val="75000"/>
+                </a:prstClr>
+              </a:solidFill>
+              <a:latin typeface="Calibri"/>
+              <a:ea typeface="+mn-ea"/>
+              <a:cs typeface="+mn-cs"/>
+            </a:endParaRPr>
+          </a:p>
+        </p:txBody>
+      </p:sp>
+    </p:spTree>
+  </p:cSld>
+  <p:clrMapOvr>
+    <a:masterClrMapping/>
+  </p:clrMapOvr>
+</p:sldLayout>
+</file>
+
+<file path=ppt/slideLayouts/slideLayout42.xml><?xml version="1.0" encoding="utf-8"?>
+<p:sldLayout xmlns:a="http://schemas.openxmlformats.org/drawingml/2006/main" xmlns:r="http://schemas.openxmlformats.org/officeDocument/2006/relationships" xmlns:p="http://schemas.openxmlformats.org/presentationml/2006/main" type="picTx" preserve="1">
+  <p:cSld name="Picture with Caption">
+    <p:spTree>
+      <p:nvGrpSpPr>
+        <p:cNvPr id="1" name=""/>
+        <p:cNvGrpSpPr/>
+        <p:nvPr/>
+      </p:nvGrpSpPr>
+      <p:grpSpPr>
+        <a:xfrm>
+          <a:off x="0" y="0"/>
+          <a:ext cx="0" cy="0"/>
+          <a:chOff x="0" y="0"/>
+          <a:chExt cx="0" cy="0"/>
+        </a:xfrm>
+      </p:grpSpPr>
+      <p:sp>
+        <p:nvSpPr>
+          <p:cNvPr id="2" name="Title 1"/>
+          <p:cNvSpPr>
+            <a:spLocks noGrp="1"/>
+          </p:cNvSpPr>
+          <p:nvPr>
+            <p:ph type="title"/>
+          </p:nvPr>
+        </p:nvSpPr>
+        <p:spPr>
+          <a:xfrm>
+            <a:off x="1792288" y="4800600"/>
+            <a:ext cx="5486400" cy="566738"/>
+          </a:xfrm>
+        </p:spPr>
+        <p:txBody>
+          <a:bodyPr anchor="b"/>
+          <a:lstStyle>
+            <a:lvl1pPr algn="l">
+              <a:defRPr sz="2000" b="1"/>
+            </a:lvl1pPr>
+          </a:lstStyle>
+          <a:p>
+            <a:r>
+              <a:rPr lang="en-US" smtClean="0"/>
+              <a:t>Click to edit Master title style</a:t>
+            </a:r>
+            <a:endParaRPr lang="en-US"/>
+          </a:p>
+        </p:txBody>
+      </p:sp>
+      <p:sp>
+        <p:nvSpPr>
+          <p:cNvPr id="3" name="Picture Placeholder 2"/>
+          <p:cNvSpPr>
+            <a:spLocks noGrp="1"/>
+          </p:cNvSpPr>
+          <p:nvPr>
+            <p:ph type="pic" idx="1"/>
+          </p:nvPr>
+        </p:nvSpPr>
+        <p:spPr>
+          <a:xfrm>
+            <a:off x="1792288" y="612775"/>
+            <a:ext cx="5486400" cy="4114800"/>
+          </a:xfrm>
+        </p:spPr>
+        <p:txBody>
+          <a:bodyPr/>
+          <a:lstStyle>
+            <a:lvl1pPr marL="0" indent="0">
+              <a:buNone/>
+              <a:defRPr sz="3200"/>
+            </a:lvl1pPr>
+            <a:lvl2pPr marL="457200" indent="0">
+              <a:buNone/>
+              <a:defRPr sz="2800"/>
+            </a:lvl2pPr>
+            <a:lvl3pPr marL="914400" indent="0">
+              <a:buNone/>
+              <a:defRPr sz="2400"/>
+            </a:lvl3pPr>
+            <a:lvl4pPr marL="1371600" indent="0">
+              <a:buNone/>
+              <a:defRPr sz="2000"/>
+            </a:lvl4pPr>
+            <a:lvl5pPr marL="1828800" indent="0">
+              <a:buNone/>
+              <a:defRPr sz="2000"/>
+            </a:lvl5pPr>
+            <a:lvl6pPr marL="2286000" indent="0">
+              <a:buNone/>
+              <a:defRPr sz="2000"/>
+            </a:lvl6pPr>
+            <a:lvl7pPr marL="2743200" indent="0">
+              <a:buNone/>
+              <a:defRPr sz="2000"/>
+            </a:lvl7pPr>
+            <a:lvl8pPr marL="3200400" indent="0">
+              <a:buNone/>
+              <a:defRPr sz="2000"/>
+            </a:lvl8pPr>
+            <a:lvl9pPr marL="3657600" indent="0">
+              <a:buNone/>
+              <a:defRPr sz="2000"/>
+            </a:lvl9pPr>
+          </a:lstStyle>
+          <a:p>
+            <a:endParaRPr lang="en-US"/>
+          </a:p>
+        </p:txBody>
+      </p:sp>
+      <p:sp>
+        <p:nvSpPr>
+          <p:cNvPr id="4" name="Text Placeholder 3"/>
+          <p:cNvSpPr>
+            <a:spLocks noGrp="1"/>
+          </p:cNvSpPr>
+          <p:nvPr>
+            <p:ph type="body" sz="half" idx="2"/>
+          </p:nvPr>
+        </p:nvSpPr>
+        <p:spPr>
+          <a:xfrm>
+            <a:off x="1792288" y="5367338"/>
+            <a:ext cx="5486400" cy="804862"/>
+          </a:xfrm>
+        </p:spPr>
+        <p:txBody>
+          <a:bodyPr/>
+          <a:lstStyle>
+            <a:lvl1pPr marL="0" indent="0">
+              <a:buNone/>
+              <a:defRPr sz="1400"/>
+            </a:lvl1pPr>
+            <a:lvl2pPr marL="457200" indent="0">
+              <a:buNone/>
+              <a:defRPr sz="1200"/>
+            </a:lvl2pPr>
+            <a:lvl3pPr marL="914400" indent="0">
+              <a:buNone/>
+              <a:defRPr sz="1000"/>
+            </a:lvl3pPr>
+            <a:lvl4pPr marL="1371600" indent="0">
+              <a:buNone/>
+              <a:defRPr sz="900"/>
+            </a:lvl4pPr>
+            <a:lvl5pPr marL="1828800" indent="0">
+              <a:buNone/>
+              <a:defRPr sz="900"/>
+            </a:lvl5pPr>
+            <a:lvl6pPr marL="2286000" indent="0">
+              <a:buNone/>
+              <a:defRPr sz="900"/>
+            </a:lvl6pPr>
+            <a:lvl7pPr marL="2743200" indent="0">
+              <a:buNone/>
+              <a:defRPr sz="900"/>
+            </a:lvl7pPr>
+            <a:lvl8pPr marL="3200400" indent="0">
+              <a:buNone/>
+              <a:defRPr sz="900"/>
+            </a:lvl8pPr>
+            <a:lvl9pPr marL="3657600" indent="0">
+              <a:buNone/>
+              <a:defRPr sz="900"/>
+            </a:lvl9pPr>
+          </a:lstStyle>
+          <a:p>
+            <a:pPr lvl="0"/>
+            <a:r>
+              <a:rPr lang="en-US" smtClean="0"/>
+              <a:t>Click to edit Master text styles</a:t>
+            </a:r>
+          </a:p>
+        </p:txBody>
+      </p:sp>
+      <p:sp>
+        <p:nvSpPr>
+          <p:cNvPr id="5" name="Date Placeholder 4"/>
+          <p:cNvSpPr>
+            <a:spLocks noGrp="1"/>
+          </p:cNvSpPr>
+          <p:nvPr>
+            <p:ph type="dt" sz="half" idx="10"/>
+          </p:nvPr>
+        </p:nvSpPr>
+        <p:spPr/>
+        <p:txBody>
+          <a:bodyPr/>
+          <a:lstStyle/>
+          <a:p>
+            <a:pPr algn="l" rtl="0"/>
+            <a:fld id="{E5B1AC9D-7C8A-4BB3-B152-489FC1CA0160}" type="datetimeFigureOut">
+              <a:rPr lang="en-US" sz="1200" kern="1200">
+                <a:solidFill>
+                  <a:prstClr val="white">
+                    <a:tint val="75000"/>
+                  </a:prstClr>
+                </a:solidFill>
+                <a:latin typeface="Calibri"/>
+                <a:ea typeface="+mn-ea"/>
+                <a:cs typeface="+mn-cs"/>
+              </a:rPr>
+              <a:pPr algn="l" rtl="0"/>
+              <a:t>3/12/2009</a:t>
+            </a:fld>
+            <a:endParaRPr lang="en-US" sz="1200" kern="1200">
+              <a:solidFill>
+                <a:prstClr val="white">
+                  <a:tint val="75000"/>
+                </a:prstClr>
+              </a:solidFill>
+              <a:latin typeface="Calibri"/>
+              <a:ea typeface="+mn-ea"/>
+              <a:cs typeface="+mn-cs"/>
+            </a:endParaRPr>
+          </a:p>
+        </p:txBody>
+      </p:sp>
+      <p:sp>
+        <p:nvSpPr>
+          <p:cNvPr id="6" name="Footer Placeholder 5"/>
+          <p:cNvSpPr>
+            <a:spLocks noGrp="1"/>
+          </p:cNvSpPr>
+          <p:nvPr>
+            <p:ph type="ftr" sz="quarter" idx="11"/>
+          </p:nvPr>
+        </p:nvSpPr>
+        <p:spPr/>
+        <p:txBody>
+          <a:bodyPr/>
+          <a:lstStyle/>
+          <a:p>
+            <a:pPr algn="ctr" rtl="0"/>
+            <a:endParaRPr lang="en-US" sz="1200" kern="1200">
+              <a:solidFill>
+                <a:prstClr val="white">
+                  <a:tint val="75000"/>
+                </a:prstClr>
+              </a:solidFill>
+              <a:latin typeface="Calibri"/>
+              <a:ea typeface="+mn-ea"/>
+              <a:cs typeface="+mn-cs"/>
+            </a:endParaRPr>
+          </a:p>
+        </p:txBody>
+      </p:sp>
+      <p:sp>
+        <p:nvSpPr>
+          <p:cNvPr id="7" name="Slide Number Placeholder 6"/>
+          <p:cNvSpPr>
+            <a:spLocks noGrp="1"/>
+          </p:cNvSpPr>
+          <p:nvPr>
+            <p:ph type="sldNum" sz="quarter" idx="12"/>
+          </p:nvPr>
+        </p:nvSpPr>
+        <p:spPr/>
+        <p:txBody>
+          <a:bodyPr/>
+          <a:lstStyle/>
+          <a:p>
+            <a:pPr algn="r" rtl="0"/>
+            <a:fld id="{37093969-7AAB-46EA-AA3B-E867A8062A99}" type="slidenum">
+              <a:rPr lang="en-US" sz="1200" kern="1200">
+                <a:solidFill>
+                  <a:prstClr val="white">
+                    <a:tint val="75000"/>
+                  </a:prstClr>
+                </a:solidFill>
+                <a:latin typeface="Calibri"/>
+                <a:ea typeface="+mn-ea"/>
+                <a:cs typeface="+mn-cs"/>
+              </a:rPr>
+              <a:pPr algn="r" rtl="0"/>
+              <a:t>‹#›</a:t>
+            </a:fld>
+            <a:endParaRPr lang="en-US" sz="1200" kern="1200">
+              <a:solidFill>
+                <a:prstClr val="white">
+                  <a:tint val="75000"/>
+                </a:prstClr>
+              </a:solidFill>
+              <a:latin typeface="Calibri"/>
+              <a:ea typeface="+mn-ea"/>
+              <a:cs typeface="+mn-cs"/>
+            </a:endParaRPr>
+          </a:p>
+        </p:txBody>
+      </p:sp>
+    </p:spTree>
+  </p:cSld>
+  <p:clrMapOvr>
+    <a:masterClrMapping/>
+  </p:clrMapOvr>
+</p:sldLayout>
+</file>
+
+<file path=ppt/slideLayouts/slideLayout43.xml><?xml version="1.0" encoding="utf-8"?>
+<p:sldLayout xmlns:a="http://schemas.openxmlformats.org/drawingml/2006/main" xmlns:r="http://schemas.openxmlformats.org/officeDocument/2006/relationships" xmlns:p="http://schemas.openxmlformats.org/presentationml/2006/main" type="vertTx" preserve="1">
+  <p:cSld name="Title and Vertical Text">
+    <p:spTree>
+      <p:nvGrpSpPr>
+        <p:cNvPr id="1" name=""/>
+        <p:cNvGrpSpPr/>
+        <p:nvPr/>
+      </p:nvGrpSpPr>
+      <p:grpSpPr>
+        <a:xfrm>
+          <a:off x="0" y="0"/>
+          <a:ext cx="0" cy="0"/>
+          <a:chOff x="0" y="0"/>
+          <a:chExt cx="0" cy="0"/>
+        </a:xfrm>
+      </p:grpSpPr>
+      <p:sp>
+        <p:nvSpPr>
+          <p:cNvPr id="2" name="Title 1"/>
+          <p:cNvSpPr>
+            <a:spLocks noGrp="1"/>
+          </p:cNvSpPr>
+          <p:nvPr>
+            <p:ph type="title"/>
+          </p:nvPr>
+        </p:nvSpPr>
+        <p:spPr/>
+        <p:txBody>
+          <a:bodyPr/>
+          <a:lstStyle/>
+          <a:p>
+            <a:r>
+              <a:rPr lang="en-US" smtClean="0"/>
+              <a:t>Click to edit Master title style</a:t>
+            </a:r>
+            <a:endParaRPr lang="en-US"/>
+          </a:p>
+        </p:txBody>
+      </p:sp>
+      <p:sp>
+        <p:nvSpPr>
+          <p:cNvPr id="3" name="Vertical Text Placeholder 2"/>
+          <p:cNvSpPr>
+            <a:spLocks noGrp="1"/>
+          </p:cNvSpPr>
+          <p:nvPr>
+            <p:ph type="body" orient="vert" idx="1"/>
+          </p:nvPr>
+        </p:nvSpPr>
+        <p:spPr/>
+        <p:txBody>
+          <a:bodyPr vert="eaVert"/>
+          <a:lstStyle/>
+          <a:p>
+            <a:pPr lvl="0"/>
+            <a:r>
+              <a:rPr lang="en-US" smtClean="0"/>
+              <a:t>Click to edit Master text styles</a:t>
+            </a:r>
+          </a:p>
+          <a:p>
+            <a:pPr lvl="1"/>
+            <a:r>
+              <a:rPr lang="en-US" smtClean="0"/>
+              <a:t>Second level</a:t>
+            </a:r>
+          </a:p>
+          <a:p>
+            <a:pPr lvl="2"/>
+            <a:r>
+              <a:rPr lang="en-US" smtClean="0"/>
+              <a:t>Third level</a:t>
+            </a:r>
+          </a:p>
+          <a:p>
+            <a:pPr lvl="3"/>
+            <a:r>
+              <a:rPr lang="en-US" smtClean="0"/>
+              <a:t>Fourth level</a:t>
+            </a:r>
+          </a:p>
+          <a:p>
+            <a:pPr lvl="4"/>
+            <a:r>
+              <a:rPr lang="en-US" smtClean="0"/>
+              <a:t>Fifth level</a:t>
+            </a:r>
+            <a:endParaRPr lang="en-US"/>
+          </a:p>
+        </p:txBody>
+      </p:sp>
+      <p:sp>
+        <p:nvSpPr>
+          <p:cNvPr id="4" name="Date Placeholder 3"/>
+          <p:cNvSpPr>
+            <a:spLocks noGrp="1"/>
+          </p:cNvSpPr>
+          <p:nvPr>
+            <p:ph type="dt" sz="half" idx="10"/>
+          </p:nvPr>
+        </p:nvSpPr>
+        <p:spPr/>
+        <p:txBody>
+          <a:bodyPr/>
+          <a:lstStyle/>
+          <a:p>
+            <a:pPr algn="l" rtl="0"/>
+            <a:fld id="{E5B1AC9D-7C8A-4BB3-B152-489FC1CA0160}" type="datetimeFigureOut">
+              <a:rPr lang="en-US" sz="1200" kern="1200">
+                <a:solidFill>
+                  <a:prstClr val="white">
+                    <a:tint val="75000"/>
+                  </a:prstClr>
+                </a:solidFill>
+                <a:latin typeface="Calibri"/>
+                <a:ea typeface="+mn-ea"/>
+                <a:cs typeface="+mn-cs"/>
+              </a:rPr>
+              <a:pPr algn="l" rtl="0"/>
+              <a:t>3/12/2009</a:t>
+            </a:fld>
+            <a:endParaRPr lang="en-US" sz="1200" kern="1200">
+              <a:solidFill>
+                <a:prstClr val="white">
+                  <a:tint val="75000"/>
+                </a:prstClr>
+              </a:solidFill>
+              <a:latin typeface="Calibri"/>
+              <a:ea typeface="+mn-ea"/>
+              <a:cs typeface="+mn-cs"/>
+            </a:endParaRPr>
+          </a:p>
+        </p:txBody>
+      </p:sp>
+      <p:sp>
+        <p:nvSpPr>
+          <p:cNvPr id="5" name="Footer Placeholder 4"/>
+          <p:cNvSpPr>
+            <a:spLocks noGrp="1"/>
+          </p:cNvSpPr>
+          <p:nvPr>
+            <p:ph type="ftr" sz="quarter" idx="11"/>
+          </p:nvPr>
+        </p:nvSpPr>
+        <p:spPr/>
+        <p:txBody>
+          <a:bodyPr/>
+          <a:lstStyle/>
+          <a:p>
+            <a:pPr algn="ctr" rtl="0"/>
+            <a:endParaRPr lang="en-US" sz="1200" kern="1200">
+              <a:solidFill>
+                <a:prstClr val="white">
+                  <a:tint val="75000"/>
+                </a:prstClr>
+              </a:solidFill>
+              <a:latin typeface="Calibri"/>
+              <a:ea typeface="+mn-ea"/>
+              <a:cs typeface="+mn-cs"/>
+            </a:endParaRPr>
+          </a:p>
+        </p:txBody>
+      </p:sp>
+      <p:sp>
+        <p:nvSpPr>
+          <p:cNvPr id="6" name="Slide Number Placeholder 5"/>
+          <p:cNvSpPr>
+            <a:spLocks noGrp="1"/>
+          </p:cNvSpPr>
+          <p:nvPr>
+            <p:ph type="sldNum" sz="quarter" idx="12"/>
+          </p:nvPr>
+        </p:nvSpPr>
+        <p:spPr/>
+        <p:txBody>
+          <a:bodyPr/>
+          <a:lstStyle/>
+          <a:p>
+            <a:pPr algn="r" rtl="0"/>
+            <a:fld id="{37093969-7AAB-46EA-AA3B-E867A8062A99}" type="slidenum">
+              <a:rPr lang="en-US" sz="1200" kern="1200">
+                <a:solidFill>
+                  <a:prstClr val="white">
+                    <a:tint val="75000"/>
+                  </a:prstClr>
+                </a:solidFill>
+                <a:latin typeface="Calibri"/>
+                <a:ea typeface="+mn-ea"/>
+                <a:cs typeface="+mn-cs"/>
+              </a:rPr>
+              <a:pPr algn="r" rtl="0"/>
+              <a:t>‹#›</a:t>
+            </a:fld>
+            <a:endParaRPr lang="en-US" sz="1200" kern="1200">
+              <a:solidFill>
+                <a:prstClr val="white">
+                  <a:tint val="75000"/>
+                </a:prstClr>
+              </a:solidFill>
+              <a:latin typeface="Calibri"/>
+              <a:ea typeface="+mn-ea"/>
+              <a:cs typeface="+mn-cs"/>
+            </a:endParaRPr>
+          </a:p>
+        </p:txBody>
+      </p:sp>
+    </p:spTree>
+  </p:cSld>
+  <p:clrMapOvr>
+    <a:masterClrMapping/>
+  </p:clrMapOvr>
+</p:sldLayout>
+</file>
+
+<file path=ppt/slideLayouts/slideLayout44.xml><?xml version="1.0" encoding="utf-8"?>
+<p:sldLayout xmlns:a="http://schemas.openxmlformats.org/drawingml/2006/main" xmlns:r="http://schemas.openxmlformats.org/officeDocument/2006/relationships" xmlns:p="http://schemas.openxmlformats.org/presentationml/2006/main" type="vertTitleAndTx" preserve="1">
+  <p:cSld name="Vertical Title and Text">
+    <p:spTree>
+      <p:nvGrpSpPr>
+        <p:cNvPr id="1" name=""/>
+        <p:cNvGrpSpPr/>
+        <p:nvPr/>
+      </p:nvGrpSpPr>
+      <p:grpSpPr>
+        <a:xfrm>
+          <a:off x="0" y="0"/>
+          <a:ext cx="0" cy="0"/>
+          <a:chOff x="0" y="0"/>
+          <a:chExt cx="0" cy="0"/>
+        </a:xfrm>
+      </p:grpSpPr>
+      <p:sp>
+        <p:nvSpPr>
+          <p:cNvPr id="2" name="Vertical Title 1"/>
+          <p:cNvSpPr>
+            <a:spLocks noGrp="1"/>
+          </p:cNvSpPr>
+          <p:nvPr>
+            <p:ph type="title" orient="vert"/>
+          </p:nvPr>
+        </p:nvSpPr>
+        <p:spPr>
+          <a:xfrm>
+            <a:off x="6629400" y="274638"/>
+            <a:ext cx="2057400" cy="5851525"/>
+          </a:xfrm>
+        </p:spPr>
+        <p:txBody>
+          <a:bodyPr vert="eaVert"/>
+          <a:lstStyle/>
+          <a:p>
+            <a:r>
+              <a:rPr lang="en-US" smtClean="0"/>
+              <a:t>Click to edit Master title style</a:t>
+            </a:r>
+            <a:endParaRPr lang="en-US"/>
+          </a:p>
+        </p:txBody>
+      </p:sp>
+      <p:sp>
+        <p:nvSpPr>
+          <p:cNvPr id="3" name="Vertical Text Placeholder 2"/>
+          <p:cNvSpPr>
+            <a:spLocks noGrp="1"/>
+          </p:cNvSpPr>
+          <p:nvPr>
+            <p:ph type="body" orient="vert" idx="1"/>
+          </p:nvPr>
+        </p:nvSpPr>
+        <p:spPr>
+          <a:xfrm>
+            <a:off x="457200" y="274638"/>
+            <a:ext cx="6019800" cy="5851525"/>
+          </a:xfrm>
+        </p:spPr>
+        <p:txBody>
+          <a:bodyPr vert="eaVert"/>
+          <a:lstStyle/>
+          <a:p>
+            <a:pPr lvl="0"/>
+            <a:r>
+              <a:rPr lang="en-US" smtClean="0"/>
+              <a:t>Click to edit Master text styles</a:t>
+            </a:r>
+          </a:p>
+          <a:p>
+            <a:pPr lvl="1"/>
+            <a:r>
+              <a:rPr lang="en-US" smtClean="0"/>
+              <a:t>Second level</a:t>
+            </a:r>
+          </a:p>
+          <a:p>
+            <a:pPr lvl="2"/>
+            <a:r>
+              <a:rPr lang="en-US" smtClean="0"/>
+              <a:t>Third level</a:t>
+            </a:r>
+          </a:p>
+          <a:p>
+            <a:pPr lvl="3"/>
+            <a:r>
+              <a:rPr lang="en-US" smtClean="0"/>
+              <a:t>Fourth level</a:t>
+            </a:r>
+          </a:p>
+          <a:p>
+            <a:pPr lvl="4"/>
+            <a:r>
+              <a:rPr lang="en-US" smtClean="0"/>
+              <a:t>Fifth level</a:t>
+            </a:r>
+            <a:endParaRPr lang="en-US"/>
+          </a:p>
+        </p:txBody>
+      </p:sp>
+      <p:sp>
+        <p:nvSpPr>
+          <p:cNvPr id="4" name="Date Placeholder 3"/>
+          <p:cNvSpPr>
+            <a:spLocks noGrp="1"/>
+          </p:cNvSpPr>
+          <p:nvPr>
+            <p:ph type="dt" sz="half" idx="10"/>
+          </p:nvPr>
+        </p:nvSpPr>
+        <p:spPr/>
+        <p:txBody>
+          <a:bodyPr/>
+          <a:lstStyle/>
+          <a:p>
+            <a:pPr algn="l" rtl="0"/>
+            <a:fld id="{E5B1AC9D-7C8A-4BB3-B152-489FC1CA0160}" type="datetimeFigureOut">
+              <a:rPr lang="en-US" sz="1200" kern="1200">
+                <a:solidFill>
+                  <a:prstClr val="white">
+                    <a:tint val="75000"/>
+                  </a:prstClr>
+                </a:solidFill>
+                <a:latin typeface="Calibri"/>
+                <a:ea typeface="+mn-ea"/>
+                <a:cs typeface="+mn-cs"/>
+              </a:rPr>
+              <a:pPr algn="l" rtl="0"/>
+              <a:t>3/12/2009</a:t>
+            </a:fld>
+            <a:endParaRPr lang="en-US" sz="1200" kern="1200">
+              <a:solidFill>
+                <a:prstClr val="white">
+                  <a:tint val="75000"/>
+                </a:prstClr>
+              </a:solidFill>
+              <a:latin typeface="Calibri"/>
+              <a:ea typeface="+mn-ea"/>
+              <a:cs typeface="+mn-cs"/>
+            </a:endParaRPr>
+          </a:p>
+        </p:txBody>
+      </p:sp>
+      <p:sp>
+        <p:nvSpPr>
+          <p:cNvPr id="5" name="Footer Placeholder 4"/>
+          <p:cNvSpPr>
+            <a:spLocks noGrp="1"/>
+          </p:cNvSpPr>
+          <p:nvPr>
+            <p:ph type="ftr" sz="quarter" idx="11"/>
+          </p:nvPr>
+        </p:nvSpPr>
+        <p:spPr/>
+        <p:txBody>
+          <a:bodyPr/>
+          <a:lstStyle/>
+          <a:p>
+            <a:pPr algn="ctr" rtl="0"/>
+            <a:endParaRPr lang="en-US" sz="1200" kern="1200">
+              <a:solidFill>
+                <a:prstClr val="white">
+                  <a:tint val="75000"/>
+                </a:prstClr>
+              </a:solidFill>
+              <a:latin typeface="Calibri"/>
+              <a:ea typeface="+mn-ea"/>
+              <a:cs typeface="+mn-cs"/>
+            </a:endParaRPr>
+          </a:p>
+        </p:txBody>
+      </p:sp>
+      <p:sp>
+        <p:nvSpPr>
+          <p:cNvPr id="6" name="Slide Number Placeholder 5"/>
+          <p:cNvSpPr>
+            <a:spLocks noGrp="1"/>
+          </p:cNvSpPr>
+          <p:nvPr>
+            <p:ph type="sldNum" sz="quarter" idx="12"/>
+          </p:nvPr>
+        </p:nvSpPr>
+        <p:spPr/>
+        <p:txBody>
+          <a:bodyPr/>
+          <a:lstStyle/>
+          <a:p>
+            <a:pPr algn="r" rtl="0"/>
+            <a:fld id="{37093969-7AAB-46EA-AA3B-E867A8062A99}" type="slidenum">
+              <a:rPr lang="en-US" sz="1200" kern="1200">
+                <a:solidFill>
+                  <a:prstClr val="white">
+                    <a:tint val="75000"/>
+                  </a:prstClr>
+                </a:solidFill>
+                <a:latin typeface="Calibri"/>
+                <a:ea typeface="+mn-ea"/>
+                <a:cs typeface="+mn-cs"/>
+              </a:rPr>
+              <a:pPr algn="r" rtl="0"/>
+              <a:t>‹#›</a:t>
+            </a:fld>
+            <a:endParaRPr lang="en-US" sz="1200" kern="1200">
+              <a:solidFill>
+                <a:prstClr val="white">
+                  <a:tint val="75000"/>
+                </a:prstClr>
+              </a:solidFill>
+              <a:latin typeface="Calibri"/>
+              <a:ea typeface="+mn-ea"/>
+              <a:cs typeface="+mn-cs"/>
+            </a:endParaRPr>
           </a:p>
         </p:txBody>
       </p:sp>
@@ -10071,6 +13029,561 @@
 </p:sldMaster>
 </file>
 
+<file path=ppt/slideMasters/slideMaster4.xml><?xml version="1.0" encoding="utf-8"?>
+<p:sldMaster xmlns:a="http://schemas.openxmlformats.org/drawingml/2006/main" xmlns:r="http://schemas.openxmlformats.org/officeDocument/2006/relationships" xmlns:p="http://schemas.openxmlformats.org/presentationml/2006/main">
+  <p:cSld>
+    <p:bg>
+      <p:bgRef idx="1001">
+        <a:schemeClr val="bg1"/>
+      </p:bgRef>
+    </p:bg>
+    <p:spTree>
+      <p:nvGrpSpPr>
+        <p:cNvPr id="1" name=""/>
+        <p:cNvGrpSpPr/>
+        <p:nvPr/>
+      </p:nvGrpSpPr>
+      <p:grpSpPr>
+        <a:xfrm>
+          <a:off x="0" y="0"/>
+          <a:ext cx="0" cy="0"/>
+          <a:chOff x="0" y="0"/>
+          <a:chExt cx="0" cy="0"/>
+        </a:xfrm>
+      </p:grpSpPr>
+      <p:sp>
+        <p:nvSpPr>
+          <p:cNvPr id="2" name="Title Placeholder 1"/>
+          <p:cNvSpPr>
+            <a:spLocks noGrp="1"/>
+          </p:cNvSpPr>
+          <p:nvPr>
+            <p:ph type="title"/>
+          </p:nvPr>
+        </p:nvSpPr>
+        <p:spPr>
+          <a:xfrm>
+            <a:off x="457200" y="274638"/>
+            <a:ext cx="8229600" cy="1143000"/>
+          </a:xfrm>
+          <a:prstGeom prst="rect">
+            <a:avLst/>
+          </a:prstGeom>
+        </p:spPr>
+        <p:txBody>
+          <a:bodyPr vert="horz" lIns="91440" tIns="45720" rIns="91440" bIns="45720" rtlCol="0" anchor="ctr">
+            <a:normAutofit/>
+          </a:bodyPr>
+          <a:lstStyle/>
+          <a:p>
+            <a:r>
+              <a:rPr lang="en-US" smtClean="0"/>
+              <a:t>Click to edit Master title style</a:t>
+            </a:r>
+            <a:endParaRPr lang="en-US"/>
+          </a:p>
+        </p:txBody>
+      </p:sp>
+      <p:sp>
+        <p:nvSpPr>
+          <p:cNvPr id="3" name="Text Placeholder 2"/>
+          <p:cNvSpPr>
+            <a:spLocks noGrp="1"/>
+          </p:cNvSpPr>
+          <p:nvPr>
+            <p:ph type="body" idx="1"/>
+          </p:nvPr>
+        </p:nvSpPr>
+        <p:spPr>
+          <a:xfrm>
+            <a:off x="457200" y="1600200"/>
+            <a:ext cx="8229600" cy="4525963"/>
+          </a:xfrm>
+          <a:prstGeom prst="rect">
+            <a:avLst/>
+          </a:prstGeom>
+        </p:spPr>
+        <p:txBody>
+          <a:bodyPr vert="horz" lIns="91440" tIns="45720" rIns="91440" bIns="45720" rtlCol="0">
+            <a:normAutofit/>
+          </a:bodyPr>
+          <a:lstStyle/>
+          <a:p>
+            <a:pPr lvl="0"/>
+            <a:r>
+              <a:rPr lang="en-US" smtClean="0"/>
+              <a:t>Click to edit Master text styles</a:t>
+            </a:r>
+          </a:p>
+          <a:p>
+            <a:pPr lvl="1"/>
+            <a:r>
+              <a:rPr lang="en-US" smtClean="0"/>
+              <a:t>Second level</a:t>
+            </a:r>
+          </a:p>
+          <a:p>
+            <a:pPr lvl="2"/>
+            <a:r>
+              <a:rPr lang="en-US" smtClean="0"/>
+              <a:t>Third level</a:t>
+            </a:r>
+          </a:p>
+          <a:p>
+            <a:pPr lvl="3"/>
+            <a:r>
+              <a:rPr lang="en-US" smtClean="0"/>
+              <a:t>Fourth level</a:t>
+            </a:r>
+          </a:p>
+          <a:p>
+            <a:pPr lvl="4"/>
+            <a:r>
+              <a:rPr lang="en-US" smtClean="0"/>
+              <a:t>Fifth level</a:t>
+            </a:r>
+            <a:endParaRPr lang="en-US"/>
+          </a:p>
+        </p:txBody>
+      </p:sp>
+      <p:sp>
+        <p:nvSpPr>
+          <p:cNvPr id="4" name="Date Placeholder 3"/>
+          <p:cNvSpPr>
+            <a:spLocks noGrp="1"/>
+          </p:cNvSpPr>
+          <p:nvPr>
+            <p:ph type="dt" sz="half" idx="2"/>
+          </p:nvPr>
+        </p:nvSpPr>
+        <p:spPr>
+          <a:xfrm>
+            <a:off x="457200" y="6356350"/>
+            <a:ext cx="2133600" cy="365125"/>
+          </a:xfrm>
+          <a:prstGeom prst="rect">
+            <a:avLst/>
+          </a:prstGeom>
+        </p:spPr>
+        <p:txBody>
+          <a:bodyPr vert="horz" lIns="91440" tIns="45720" rIns="91440" bIns="45720" rtlCol="0" anchor="ctr"/>
+          <a:lstStyle>
+            <a:lvl1pPr algn="l">
+              <a:defRPr sz="1200">
+                <a:solidFill>
+                  <a:schemeClr val="tx1">
+                    <a:tint val="75000"/>
+                  </a:schemeClr>
+                </a:solidFill>
+              </a:defRPr>
+            </a:lvl1pPr>
+          </a:lstStyle>
+          <a:p>
+            <a:pPr rtl="0"/>
+            <a:fld id="{E5B1AC9D-7C8A-4BB3-B152-489FC1CA0160}" type="datetimeFigureOut">
+              <a:rPr lang="en-US" kern="1200" smtClean="0">
+                <a:solidFill>
+                  <a:prstClr val="white">
+                    <a:tint val="75000"/>
+                  </a:prstClr>
+                </a:solidFill>
+                <a:latin typeface="Calibri"/>
+                <a:ea typeface="+mn-ea"/>
+                <a:cs typeface="+mn-cs"/>
+              </a:rPr>
+              <a:pPr rtl="0"/>
+              <a:t>3/12/2009</a:t>
+            </a:fld>
+            <a:endParaRPr lang="en-US" kern="1200">
+              <a:solidFill>
+                <a:prstClr val="white">
+                  <a:tint val="75000"/>
+                </a:prstClr>
+              </a:solidFill>
+              <a:latin typeface="Calibri"/>
+              <a:ea typeface="+mn-ea"/>
+              <a:cs typeface="+mn-cs"/>
+            </a:endParaRPr>
+          </a:p>
+        </p:txBody>
+      </p:sp>
+      <p:sp>
+        <p:nvSpPr>
+          <p:cNvPr id="5" name="Footer Placeholder 4"/>
+          <p:cNvSpPr>
+            <a:spLocks noGrp="1"/>
+          </p:cNvSpPr>
+          <p:nvPr>
+            <p:ph type="ftr" sz="quarter" idx="3"/>
+          </p:nvPr>
+        </p:nvSpPr>
+        <p:spPr>
+          <a:xfrm>
+            <a:off x="3124200" y="6356350"/>
+            <a:ext cx="2895600" cy="365125"/>
+          </a:xfrm>
+          <a:prstGeom prst="rect">
+            <a:avLst/>
+          </a:prstGeom>
+        </p:spPr>
+        <p:txBody>
+          <a:bodyPr vert="horz" lIns="91440" tIns="45720" rIns="91440" bIns="45720" rtlCol="0" anchor="ctr"/>
+          <a:lstStyle>
+            <a:lvl1pPr algn="ctr">
+              <a:defRPr sz="1200">
+                <a:solidFill>
+                  <a:schemeClr val="tx1">
+                    <a:tint val="75000"/>
+                  </a:schemeClr>
+                </a:solidFill>
+              </a:defRPr>
+            </a:lvl1pPr>
+          </a:lstStyle>
+          <a:p>
+            <a:pPr rtl="0"/>
+            <a:endParaRPr lang="en-US" kern="1200">
+              <a:solidFill>
+                <a:prstClr val="white">
+                  <a:tint val="75000"/>
+                </a:prstClr>
+              </a:solidFill>
+              <a:latin typeface="Calibri"/>
+              <a:ea typeface="+mn-ea"/>
+              <a:cs typeface="+mn-cs"/>
+            </a:endParaRPr>
+          </a:p>
+        </p:txBody>
+      </p:sp>
+      <p:sp>
+        <p:nvSpPr>
+          <p:cNvPr id="6" name="Slide Number Placeholder 5"/>
+          <p:cNvSpPr>
+            <a:spLocks noGrp="1"/>
+          </p:cNvSpPr>
+          <p:nvPr>
+            <p:ph type="sldNum" sz="quarter" idx="4"/>
+          </p:nvPr>
+        </p:nvSpPr>
+        <p:spPr>
+          <a:xfrm>
+            <a:off x="6553200" y="6356350"/>
+            <a:ext cx="2133600" cy="365125"/>
+          </a:xfrm>
+          <a:prstGeom prst="rect">
+            <a:avLst/>
+          </a:prstGeom>
+        </p:spPr>
+        <p:txBody>
+          <a:bodyPr vert="horz" lIns="91440" tIns="45720" rIns="91440" bIns="45720" rtlCol="0" anchor="ctr"/>
+          <a:lstStyle>
+            <a:lvl1pPr algn="r">
+              <a:defRPr sz="1200">
+                <a:solidFill>
+                  <a:schemeClr val="tx1">
+                    <a:tint val="75000"/>
+                  </a:schemeClr>
+                </a:solidFill>
+              </a:defRPr>
+            </a:lvl1pPr>
+          </a:lstStyle>
+          <a:p>
+            <a:pPr rtl="0"/>
+            <a:fld id="{37093969-7AAB-46EA-AA3B-E867A8062A99}" type="slidenum">
+              <a:rPr lang="en-US" kern="1200" smtClean="0">
+                <a:solidFill>
+                  <a:prstClr val="white">
+                    <a:tint val="75000"/>
+                  </a:prstClr>
+                </a:solidFill>
+                <a:latin typeface="Calibri"/>
+                <a:ea typeface="+mn-ea"/>
+                <a:cs typeface="+mn-cs"/>
+              </a:rPr>
+              <a:pPr rtl="0"/>
+              <a:t>‹#›</a:t>
+            </a:fld>
+            <a:endParaRPr lang="en-US" kern="1200">
+              <a:solidFill>
+                <a:prstClr val="white">
+                  <a:tint val="75000"/>
+                </a:prstClr>
+              </a:solidFill>
+              <a:latin typeface="Calibri"/>
+              <a:ea typeface="+mn-ea"/>
+              <a:cs typeface="+mn-cs"/>
+            </a:endParaRPr>
+          </a:p>
+        </p:txBody>
+      </p:sp>
+    </p:spTree>
+  </p:cSld>
+  <p:clrMap bg1="dk1" tx1="lt1" bg2="dk2" tx2="lt2" accent1="accent1" accent2="accent2" accent3="accent3" accent4="accent4" accent5="accent5" accent6="accent6" hlink="hlink" folHlink="folHlink"/>
+  <p:sldLayoutIdLst>
+    <p:sldLayoutId id="2147483685" r:id="rId1"/>
+    <p:sldLayoutId id="2147483686" r:id="rId2"/>
+    <p:sldLayoutId id="2147483687" r:id="rId3"/>
+    <p:sldLayoutId id="2147483688" r:id="rId4"/>
+    <p:sldLayoutId id="2147483689" r:id="rId5"/>
+    <p:sldLayoutId id="2147483690" r:id="rId6"/>
+    <p:sldLayoutId id="2147483691" r:id="rId7"/>
+    <p:sldLayoutId id="2147483692" r:id="rId8"/>
+    <p:sldLayoutId id="2147483693" r:id="rId9"/>
+    <p:sldLayoutId id="2147483694" r:id="rId10"/>
+    <p:sldLayoutId id="2147483695" r:id="rId11"/>
+  </p:sldLayoutIdLst>
+  <p:txStyles>
+    <p:titleStyle>
+      <a:lvl1pPr algn="ctr" defTabSz="914400" rtl="0" eaLnBrk="1" latinLnBrk="0" hangingPunct="1">
+        <a:spcBef>
+          <a:spcPct val="0"/>
+        </a:spcBef>
+        <a:buNone/>
+        <a:defRPr sz="4400" kern="1200">
+          <a:solidFill>
+            <a:schemeClr val="tx1"/>
+          </a:solidFill>
+          <a:latin typeface="+mj-lt"/>
+          <a:ea typeface="+mj-ea"/>
+          <a:cs typeface="+mj-cs"/>
+        </a:defRPr>
+      </a:lvl1pPr>
+    </p:titleStyle>
+    <p:bodyStyle>
+      <a:lvl1pPr marL="342900" indent="-342900" algn="l" defTabSz="914400" rtl="0" eaLnBrk="1" latinLnBrk="0" hangingPunct="1">
+        <a:spcBef>
+          <a:spcPct val="20000"/>
+        </a:spcBef>
+        <a:buFont typeface="Arial" pitchFamily="34" charset="0"/>
+        <a:buChar char="•"/>
+        <a:defRPr sz="3200" kern="1200">
+          <a:solidFill>
+            <a:schemeClr val="tx1"/>
+          </a:solidFill>
+          <a:latin typeface="+mn-lt"/>
+          <a:ea typeface="+mn-ea"/>
+          <a:cs typeface="+mn-cs"/>
+        </a:defRPr>
+      </a:lvl1pPr>
+      <a:lvl2pPr marL="742950" indent="-285750" algn="l" defTabSz="914400" rtl="0" eaLnBrk="1" latinLnBrk="0" hangingPunct="1">
+        <a:spcBef>
+          <a:spcPct val="20000"/>
+        </a:spcBef>
+        <a:buFont typeface="Arial" pitchFamily="34" charset="0"/>
+        <a:buChar char="–"/>
+        <a:defRPr sz="2800" kern="1200">
+          <a:solidFill>
+            <a:schemeClr val="tx1"/>
+          </a:solidFill>
+          <a:latin typeface="+mn-lt"/>
+          <a:ea typeface="+mn-ea"/>
+          <a:cs typeface="+mn-cs"/>
+        </a:defRPr>
+      </a:lvl2pPr>
+      <a:lvl3pPr marL="1143000" indent="-228600" algn="l" defTabSz="914400" rtl="0" eaLnBrk="1" latinLnBrk="0" hangingPunct="1">
+        <a:spcBef>
+          <a:spcPct val="20000"/>
+        </a:spcBef>
+        <a:buFont typeface="Arial" pitchFamily="34" charset="0"/>
+        <a:buChar char="•"/>
+        <a:defRPr sz="2400" kern="1200">
+          <a:solidFill>
+            <a:schemeClr val="tx1"/>
+          </a:solidFill>
+          <a:latin typeface="+mn-lt"/>
+          <a:ea typeface="+mn-ea"/>
+          <a:cs typeface="+mn-cs"/>
+        </a:defRPr>
+      </a:lvl3pPr>
+      <a:lvl4pPr marL="1600200" indent="-228600" algn="l" defTabSz="914400" rtl="0" eaLnBrk="1" latinLnBrk="0" hangingPunct="1">
+        <a:spcBef>
+          <a:spcPct val="20000"/>
+        </a:spcBef>
+        <a:buFont typeface="Arial" pitchFamily="34" charset="0"/>
+        <a:buChar char="–"/>
+        <a:defRPr sz="2000" kern="1200">
+          <a:solidFill>
+            <a:schemeClr val="tx1"/>
+          </a:solidFill>
+          <a:latin typeface="+mn-lt"/>
+          <a:ea typeface="+mn-ea"/>
+          <a:cs typeface="+mn-cs"/>
+        </a:defRPr>
+      </a:lvl4pPr>
+      <a:lvl5pPr marL="2057400" indent="-228600" algn="l" defTabSz="914400" rtl="0" eaLnBrk="1" latinLnBrk="0" hangingPunct="1">
+        <a:spcBef>
+          <a:spcPct val="20000"/>
+        </a:spcBef>
+        <a:buFont typeface="Arial" pitchFamily="34" charset="0"/>
+        <a:buChar char="»"/>
+        <a:defRPr sz="2000" kern="1200">
+          <a:solidFill>
+            <a:schemeClr val="tx1"/>
+          </a:solidFill>
+          <a:latin typeface="+mn-lt"/>
+          <a:ea typeface="+mn-ea"/>
+          <a:cs typeface="+mn-cs"/>
+        </a:defRPr>
+      </a:lvl5pPr>
+      <a:lvl6pPr marL="2514600" indent="-228600" algn="l" defTabSz="914400" rtl="0" eaLnBrk="1" latinLnBrk="0" hangingPunct="1">
+        <a:spcBef>
+          <a:spcPct val="20000"/>
+        </a:spcBef>
+        <a:buFont typeface="Arial" pitchFamily="34" charset="0"/>
+        <a:buChar char="•"/>
+        <a:defRPr sz="2000" kern="1200">
+          <a:solidFill>
+            <a:schemeClr val="tx1"/>
+          </a:solidFill>
+          <a:latin typeface="+mn-lt"/>
+          <a:ea typeface="+mn-ea"/>
+          <a:cs typeface="+mn-cs"/>
+        </a:defRPr>
+      </a:lvl6pPr>
+      <a:lvl7pPr marL="2971800" indent="-228600" algn="l" defTabSz="914400" rtl="0" eaLnBrk="1" latinLnBrk="0" hangingPunct="1">
+        <a:spcBef>
+          <a:spcPct val="20000"/>
+        </a:spcBef>
+        <a:buFont typeface="Arial" pitchFamily="34" charset="0"/>
+        <a:buChar char="•"/>
+        <a:defRPr sz="2000" kern="1200">
+          <a:solidFill>
+            <a:schemeClr val="tx1"/>
+          </a:solidFill>
+          <a:latin typeface="+mn-lt"/>
+          <a:ea typeface="+mn-ea"/>
+          <a:cs typeface="+mn-cs"/>
+        </a:defRPr>
+      </a:lvl7pPr>
+      <a:lvl8pPr marL="3429000" indent="-228600" algn="l" defTabSz="914400" rtl="0" eaLnBrk="1" latinLnBrk="0" hangingPunct="1">
+        <a:spcBef>
+          <a:spcPct val="20000"/>
+        </a:spcBef>
+        <a:buFont typeface="Arial" pitchFamily="34" charset="0"/>
+        <a:buChar char="•"/>
+        <a:defRPr sz="2000" kern="1200">
+          <a:solidFill>
+            <a:schemeClr val="tx1"/>
+          </a:solidFill>
+          <a:latin typeface="+mn-lt"/>
+          <a:ea typeface="+mn-ea"/>
+          <a:cs typeface="+mn-cs"/>
+        </a:defRPr>
+      </a:lvl8pPr>
+      <a:lvl9pPr marL="3886200" indent="-228600" algn="l" defTabSz="914400" rtl="0" eaLnBrk="1" latinLnBrk="0" hangingPunct="1">
+        <a:spcBef>
+          <a:spcPct val="20000"/>
+        </a:spcBef>
+        <a:buFont typeface="Arial" pitchFamily="34" charset="0"/>
+        <a:buChar char="•"/>
+        <a:defRPr sz="2000" kern="1200">
+          <a:solidFill>
+            <a:schemeClr val="tx1"/>
+          </a:solidFill>
+          <a:latin typeface="+mn-lt"/>
+          <a:ea typeface="+mn-ea"/>
+          <a:cs typeface="+mn-cs"/>
+        </a:defRPr>
+      </a:lvl9pPr>
+    </p:bodyStyle>
+    <p:otherStyle>
+      <a:defPPr>
+        <a:defRPr lang="en-US"/>
+      </a:defPPr>
+      <a:lvl1pPr marL="0" algn="l" defTabSz="914400" rtl="0" eaLnBrk="1" latinLnBrk="0" hangingPunct="1">
+        <a:defRPr sz="1800" kern="1200">
+          <a:solidFill>
+            <a:schemeClr val="tx1"/>
+          </a:solidFill>
+          <a:latin typeface="+mn-lt"/>
+          <a:ea typeface="+mn-ea"/>
+          <a:cs typeface="+mn-cs"/>
+        </a:defRPr>
+      </a:lvl1pPr>
+      <a:lvl2pPr marL="457200" algn="l" defTabSz="914400" rtl="0" eaLnBrk="1" latinLnBrk="0" hangingPunct="1">
+        <a:defRPr sz="1800" kern="1200">
+          <a:solidFill>
+            <a:schemeClr val="tx1"/>
+          </a:solidFill>
+          <a:latin typeface="+mn-lt"/>
+          <a:ea typeface="+mn-ea"/>
+          <a:cs typeface="+mn-cs"/>
+        </a:defRPr>
+      </a:lvl2pPr>
+      <a:lvl3pPr marL="914400" algn="l" defTabSz="914400" rtl="0" eaLnBrk="1" latinLnBrk="0" hangingPunct="1">
+        <a:defRPr sz="1800" kern="1200">
+          <a:solidFill>
+            <a:schemeClr val="tx1"/>
+          </a:solidFill>
+          <a:latin typeface="+mn-lt"/>
+          <a:ea typeface="+mn-ea"/>
+          <a:cs typeface="+mn-cs"/>
+        </a:defRPr>
+      </a:lvl3pPr>
+      <a:lvl4pPr marL="1371600" algn="l" defTabSz="914400" rtl="0" eaLnBrk="1" latinLnBrk="0" hangingPunct="1">
+        <a:defRPr sz="1800" kern="1200">
+          <a:solidFill>
+            <a:schemeClr val="tx1"/>
+          </a:solidFill>
+          <a:latin typeface="+mn-lt"/>
+          <a:ea typeface="+mn-ea"/>
+          <a:cs typeface="+mn-cs"/>
+        </a:defRPr>
+      </a:lvl4pPr>
+      <a:lvl5pPr marL="1828800" algn="l" defTabSz="914400" rtl="0" eaLnBrk="1" latinLnBrk="0" hangingPunct="1">
+        <a:defRPr sz="1800" kern="1200">
+          <a:solidFill>
+            <a:schemeClr val="tx1"/>
+          </a:solidFill>
+          <a:latin typeface="+mn-lt"/>
+          <a:ea typeface="+mn-ea"/>
+          <a:cs typeface="+mn-cs"/>
+        </a:defRPr>
+      </a:lvl5pPr>
+      <a:lvl6pPr marL="2286000" algn="l" defTabSz="914400" rtl="0" eaLnBrk="1" latinLnBrk="0" hangingPunct="1">
+        <a:defRPr sz="1800" kern="1200">
+          <a:solidFill>
+            <a:schemeClr val="tx1"/>
+          </a:solidFill>
+          <a:latin typeface="+mn-lt"/>
+          <a:ea typeface="+mn-ea"/>
+          <a:cs typeface="+mn-cs"/>
+        </a:defRPr>
+      </a:lvl6pPr>
+      <a:lvl7pPr marL="2743200" algn="l" defTabSz="914400" rtl="0" eaLnBrk="1" latinLnBrk="0" hangingPunct="1">
+        <a:defRPr sz="1800" kern="1200">
+          <a:solidFill>
+            <a:schemeClr val="tx1"/>
+          </a:solidFill>
+          <a:latin typeface="+mn-lt"/>
+          <a:ea typeface="+mn-ea"/>
+          <a:cs typeface="+mn-cs"/>
+        </a:defRPr>
+      </a:lvl7pPr>
+      <a:lvl8pPr marL="3200400" algn="l" defTabSz="914400" rtl="0" eaLnBrk="1" latinLnBrk="0" hangingPunct="1">
+        <a:defRPr sz="1800" kern="1200">
+          <a:solidFill>
+            <a:schemeClr val="tx1"/>
+          </a:solidFill>
+          <a:latin typeface="+mn-lt"/>
+          <a:ea typeface="+mn-ea"/>
+          <a:cs typeface="+mn-cs"/>
+        </a:defRPr>
+      </a:lvl8pPr>
+      <a:lvl9pPr marL="3657600" algn="l" defTabSz="914400" rtl="0" eaLnBrk="1" latinLnBrk="0" hangingPunct="1">
+        <a:defRPr sz="1800" kern="1200">
+          <a:solidFill>
+            <a:schemeClr val="tx1"/>
+          </a:solidFill>
+          <a:latin typeface="+mn-lt"/>
+          <a:ea typeface="+mn-ea"/>
+          <a:cs typeface="+mn-cs"/>
+        </a:defRPr>
+      </a:lvl9pPr>
+    </p:otherStyle>
+  </p:txStyles>
+</p:sldMaster>
+</file>
+
 <file path=ppt/slides/slide1.xml><?xml version="1.0" encoding="utf-8"?>
 <p:sld xmlns:a="http://schemas.openxmlformats.org/drawingml/2006/main" xmlns:r="http://schemas.openxmlformats.org/officeDocument/2006/relationships" xmlns:p="http://schemas.openxmlformats.org/presentationml/2006/main">
   <p:cSld>
@@ -10306,10 +13819,13 @@
                   </a:innerShdw>
                 </a:effectLst>
               </a:rPr>
-              <a:t>Michael C. </a:t>
-            </a:r>
-            <a:r>
-              <a:rPr lang="en-US" sz="5400" b="1" cap="none" spc="50" dirty="0" smtClean="0">
+              <a:t>Michael C. Neel MVP</a:t>
+            </a:r>
+          </a:p>
+          <a:p>
+            <a:pPr algn="ctr"/>
+            <a:r>
+              <a:rPr lang="en-US" sz="4000" b="1" spc="50" dirty="0">
                 <a:ln w="13500">
                   <a:solidFill>
                     <a:schemeClr val="accent1">
@@ -10333,9 +13849,66 @@
                   </a:innerShdw>
                 </a:effectLst>
               </a:rPr>
-              <a:t>Neel MVP</a:t>
-            </a:r>
-            <a:endParaRPr lang="en-US" sz="5400" b="1" cap="none" spc="50" dirty="0" smtClean="0">
+              <a:t>m</a:t>
+            </a:r>
+            <a:r>
+              <a:rPr lang="en-US" sz="4000" b="1" spc="50" dirty="0" smtClean="0">
+                <a:ln w="13500">
+                  <a:solidFill>
+                    <a:schemeClr val="accent1">
+                      <a:shade val="2500"/>
+                      <a:alpha val="6500"/>
+                    </a:schemeClr>
+                  </a:solidFill>
+                  <a:prstDash val="solid"/>
+                </a:ln>
+                <a:solidFill>
+                  <a:schemeClr val="accent1">
+                    <a:tint val="3000"/>
+                    <a:alpha val="95000"/>
+                  </a:schemeClr>
+                </a:solidFill>
+                <a:effectLst>
+                  <a:innerShdw blurRad="50900" dist="38500" dir="13500000">
+                    <a:srgbClr val="000000">
+                      <a:alpha val="60000"/>
+                    </a:srgbClr>
+                  </a:innerShdw>
+                </a:effectLst>
+              </a:rPr>
+              <a:t>ichael.neel@gmail.com</a:t>
+            </a:r>
+          </a:p>
+          <a:p>
+            <a:pPr algn="ctr"/>
+            <a:r>
+              <a:rPr lang="en-US" sz="4000" b="1" cap="none" spc="50" dirty="0" smtClean="0">
+                <a:ln w="13500">
+                  <a:solidFill>
+                    <a:schemeClr val="accent1">
+                      <a:shade val="2500"/>
+                      <a:alpha val="6500"/>
+                    </a:schemeClr>
+                  </a:solidFill>
+                  <a:prstDash val="solid"/>
+                </a:ln>
+                <a:solidFill>
+                  <a:schemeClr val="accent1">
+                    <a:tint val="3000"/>
+                    <a:alpha val="95000"/>
+                  </a:schemeClr>
+                </a:solidFill>
+                <a:effectLst>
+                  <a:innerShdw blurRad="50900" dist="38500" dir="13500000">
+                    <a:srgbClr val="000000">
+                      <a:alpha val="60000"/>
+                    </a:srgbClr>
+                  </a:innerShdw>
+                </a:effectLst>
+              </a:rPr>
+              <a:t>http://www.vinull.com</a:t>
+            </a:r>
+            <a:endParaRPr lang="en-US" sz="4000" b="1" cap="none" spc="50" dirty="0">
               <a:ln w="13500">
                 <a:solidFill>
                   <a:schemeClr val="accent1">
@@ -10360,117 +13933,6 @@
               </a:effectLst>
             </a:endParaRPr>
           </a:p>
-          <a:p>
-            <a:pPr algn="ctr"/>
-            <a:r>
-              <a:rPr lang="en-US" sz="4000" b="1" spc="50" dirty="0">
-                <a:ln w="13500">
-                  <a:solidFill>
-                    <a:schemeClr val="accent1">
-                      <a:shade val="2500"/>
-                      <a:alpha val="6500"/>
-                    </a:schemeClr>
-                  </a:solidFill>
-                  <a:prstDash val="solid"/>
-                </a:ln>
-                <a:solidFill>
-                  <a:schemeClr val="accent1">
-                    <a:tint val="3000"/>
-                    <a:alpha val="95000"/>
-                  </a:schemeClr>
-                </a:solidFill>
-                <a:effectLst>
-                  <a:innerShdw blurRad="50900" dist="38500" dir="13500000">
-                    <a:srgbClr val="000000">
-                      <a:alpha val="60000"/>
-                    </a:srgbClr>
-                  </a:innerShdw>
-                </a:effectLst>
-              </a:rPr>
-              <a:t>m</a:t>
-            </a:r>
-            <a:r>
-              <a:rPr lang="en-US" sz="4000" b="1" spc="50" dirty="0" smtClean="0">
-                <a:ln w="13500">
-                  <a:solidFill>
-                    <a:schemeClr val="accent1">
-                      <a:shade val="2500"/>
-                      <a:alpha val="6500"/>
-                    </a:schemeClr>
-                  </a:solidFill>
-                  <a:prstDash val="solid"/>
-                </a:ln>
-                <a:solidFill>
-                  <a:schemeClr val="accent1">
-                    <a:tint val="3000"/>
-                    <a:alpha val="95000"/>
-                  </a:schemeClr>
-                </a:solidFill>
-                <a:effectLst>
-                  <a:innerShdw blurRad="50900" dist="38500" dir="13500000">
-                    <a:srgbClr val="000000">
-                      <a:alpha val="60000"/>
-                    </a:srgbClr>
-                  </a:innerShdw>
-                </a:effectLst>
-              </a:rPr>
-              <a:t>ichael.neel@gmail.com</a:t>
-            </a:r>
-          </a:p>
-          <a:p>
-            <a:pPr algn="ctr"/>
-            <a:r>
-              <a:rPr lang="en-US" sz="4000" b="1" cap="none" spc="50" dirty="0" smtClean="0">
-                <a:ln w="13500">
-                  <a:solidFill>
-                    <a:schemeClr val="accent1">
-                      <a:shade val="2500"/>
-                      <a:alpha val="6500"/>
-                    </a:schemeClr>
-                  </a:solidFill>
-                  <a:prstDash val="solid"/>
-                </a:ln>
-                <a:solidFill>
-                  <a:schemeClr val="accent1">
-                    <a:tint val="3000"/>
-                    <a:alpha val="95000"/>
-                  </a:schemeClr>
-                </a:solidFill>
-                <a:effectLst>
-                  <a:innerShdw blurRad="50900" dist="38500" dir="13500000">
-                    <a:srgbClr val="000000">
-                      <a:alpha val="60000"/>
-                    </a:srgbClr>
-                  </a:innerShdw>
-                </a:effectLst>
-              </a:rPr>
-              <a:t>http://www.vinull.com</a:t>
-            </a:r>
-            <a:endParaRPr lang="en-US" sz="4000" b="1" cap="none" spc="50" dirty="0">
-              <a:ln w="13500">
-                <a:solidFill>
-                  <a:schemeClr val="accent1">
-                    <a:shade val="2500"/>
-                    <a:alpha val="6500"/>
-                  </a:schemeClr>
-                </a:solidFill>
-                <a:prstDash val="solid"/>
-              </a:ln>
-              <a:solidFill>
-                <a:schemeClr val="accent1">
-                  <a:tint val="3000"/>
-                  <a:alpha val="95000"/>
-                </a:schemeClr>
-              </a:solidFill>
-              <a:effectLst>
-                <a:innerShdw blurRad="50900" dist="38500" dir="13500000">
-                  <a:srgbClr val="000000">
-                    <a:alpha val="60000"/>
-                  </a:srgbClr>
-                </a:innerShdw>
-              </a:effectLst>
-            </a:endParaRPr>
-          </a:p>
         </p:txBody>
       </p:sp>
     </p:spTree>
@@ -10489,6 +13951,381 @@
 </file>
 
 <file path=ppt/slides/slide2.xml><?xml version="1.0" encoding="utf-8"?>
+<p:sld xmlns:a="http://schemas.openxmlformats.org/drawingml/2006/main" xmlns:r="http://schemas.openxmlformats.org/officeDocument/2006/relationships" xmlns:p="http://schemas.openxmlformats.org/presentationml/2006/main">
+  <p:cSld>
+    <p:spTree>
+      <p:nvGrpSpPr>
+        <p:cNvPr id="1" name=""/>
+        <p:cNvGrpSpPr/>
+        <p:nvPr/>
+      </p:nvGrpSpPr>
+      <p:grpSpPr>
+        <a:xfrm>
+          <a:off x="0" y="0"/>
+          <a:ext cx="0" cy="0"/>
+          <a:chOff x="0" y="0"/>
+          <a:chExt cx="0" cy="0"/>
+        </a:xfrm>
+      </p:grpSpPr>
+      <p:sp>
+        <p:nvSpPr>
+          <p:cNvPr id="2" name="Title 1"/>
+          <p:cNvSpPr>
+            <a:spLocks noGrp="1"/>
+          </p:cNvSpPr>
+          <p:nvPr>
+            <p:ph type="title"/>
+          </p:nvPr>
+        </p:nvSpPr>
+        <p:spPr>
+          <a:xfrm>
+            <a:off x="3505200" y="274638"/>
+            <a:ext cx="5181600" cy="1143000"/>
+          </a:xfrm>
+        </p:spPr>
+        <p:txBody>
+          <a:bodyPr/>
+          <a:lstStyle/>
+          <a:p>
+            <a:r>
+              <a:rPr lang="en-US" dirty="0" smtClean="0"/>
+              <a:t>June 26</a:t>
+            </a:r>
+            <a:r>
+              <a:rPr lang="en-US" baseline="30000" dirty="0" smtClean="0"/>
+              <a:t>th</a:t>
+            </a:r>
+            <a:r>
+              <a:rPr lang="en-US" dirty="0" smtClean="0"/>
+              <a:t> – 27</a:t>
+            </a:r>
+            <a:r>
+              <a:rPr lang="en-US" baseline="30000" dirty="0" smtClean="0"/>
+              <a:t>th</a:t>
+            </a:r>
+            <a:r>
+              <a:rPr lang="en-US" dirty="0" smtClean="0"/>
+              <a:t> 2009</a:t>
+            </a:r>
+            <a:endParaRPr lang="en-US" dirty="0"/>
+          </a:p>
+        </p:txBody>
+      </p:sp>
+      <p:pic>
+        <p:nvPicPr>
+          <p:cNvPr id="1028" name="Picture 4"/>
+          <p:cNvPicPr>
+            <a:picLocks noChangeAspect="1" noChangeArrowheads="1"/>
+          </p:cNvPicPr>
+          <p:nvPr/>
+        </p:nvPicPr>
+        <p:blipFill>
+          <a:blip r:embed="rId2"/>
+          <a:srcRect/>
+          <a:stretch>
+            <a:fillRect/>
+          </a:stretch>
+        </p:blipFill>
+        <p:spPr bwMode="auto">
+          <a:xfrm>
+            <a:off x="5791200" y="1524000"/>
+            <a:ext cx="3100594" cy="4908168"/>
+          </a:xfrm>
+          <a:prstGeom prst="rect">
+            <a:avLst/>
+          </a:prstGeom>
+          <a:noFill/>
+          <a:ln w="9525">
+            <a:noFill/>
+            <a:miter lim="800000"/>
+            <a:headEnd/>
+            <a:tailEnd/>
+          </a:ln>
+          <a:effectLst/>
+        </p:spPr>
+      </p:pic>
+      <p:pic>
+        <p:nvPicPr>
+          <p:cNvPr id="2050" name="Picture 2"/>
+          <p:cNvPicPr>
+            <a:picLocks noChangeAspect="1" noChangeArrowheads="1"/>
+          </p:cNvPicPr>
+          <p:nvPr/>
+        </p:nvPicPr>
+        <p:blipFill>
+          <a:blip r:embed="rId3"/>
+          <a:srcRect/>
+          <a:stretch>
+            <a:fillRect/>
+          </a:stretch>
+        </p:blipFill>
+        <p:spPr bwMode="auto">
+          <a:xfrm>
+            <a:off x="152400" y="152400"/>
+            <a:ext cx="3390900" cy="1803400"/>
+          </a:xfrm>
+          <a:prstGeom prst="rect">
+            <a:avLst/>
+          </a:prstGeom>
+          <a:noFill/>
+          <a:ln w="9525">
+            <a:noFill/>
+            <a:miter lim="800000"/>
+            <a:headEnd/>
+            <a:tailEnd/>
+          </a:ln>
+          <a:effectLst/>
+        </p:spPr>
+      </p:pic>
+      <p:sp>
+        <p:nvSpPr>
+          <p:cNvPr id="9" name="Content Placeholder 2"/>
+          <p:cNvSpPr txBox="1">
+            <a:spLocks/>
+          </p:cNvSpPr>
+          <p:nvPr/>
+        </p:nvSpPr>
+        <p:spPr>
+          <a:xfrm>
+            <a:off x="457200" y="1981200"/>
+            <a:ext cx="5715000" cy="4572000"/>
+          </a:xfrm>
+          <a:prstGeom prst="rect">
+            <a:avLst/>
+          </a:prstGeom>
+        </p:spPr>
+        <p:txBody>
+          <a:bodyPr vert="horz" lIns="91440" tIns="45720" rIns="91440" bIns="45720" rtlCol="0">
+            <a:normAutofit fontScale="92500"/>
+          </a:bodyPr>
+          <a:lstStyle/>
+          <a:p>
+            <a:pPr marL="342900" indent="-342900" algn="l" rtl="0">
+              <a:spcBef>
+                <a:spcPct val="20000"/>
+              </a:spcBef>
+              <a:buFont typeface="Arial" pitchFamily="34" charset="0"/>
+              <a:buChar char="•"/>
+              <a:defRPr/>
+            </a:pPr>
+            <a:r>
+              <a:rPr lang="en-US" sz="3200" kern="1200" dirty="0">
+                <a:solidFill>
+                  <a:prstClr val="white"/>
+                </a:solidFill>
+                <a:latin typeface="Calibri"/>
+                <a:ea typeface="+mn-ea"/>
+                <a:cs typeface="+mn-cs"/>
+              </a:rPr>
+              <a:t>Knoxville, TN</a:t>
+            </a:r>
+          </a:p>
+          <a:p>
+            <a:pPr marL="342900" indent="-342900" algn="l" rtl="0">
+              <a:spcBef>
+                <a:spcPct val="20000"/>
+              </a:spcBef>
+              <a:buFont typeface="Arial" pitchFamily="34" charset="0"/>
+              <a:buChar char="•"/>
+              <a:defRPr/>
+            </a:pPr>
+            <a:r>
+              <a:rPr lang="en-US" sz="3200" kern="1200" dirty="0">
+                <a:solidFill>
+                  <a:prstClr val="white"/>
+                </a:solidFill>
+                <a:latin typeface="Calibri"/>
+                <a:ea typeface="+mn-ea"/>
+                <a:cs typeface="+mn-cs"/>
+              </a:rPr>
+              <a:t>Regional Speakers / Open Spaces</a:t>
+            </a:r>
+          </a:p>
+          <a:p>
+            <a:pPr marL="342900" indent="-342900" algn="l" rtl="0">
+              <a:spcBef>
+                <a:spcPct val="20000"/>
+              </a:spcBef>
+              <a:buFont typeface="Arial" pitchFamily="34" charset="0"/>
+              <a:buChar char="•"/>
+              <a:defRPr/>
+            </a:pPr>
+            <a:r>
+              <a:rPr lang="en-US" sz="3200" kern="1200" dirty="0">
+                <a:solidFill>
+                  <a:prstClr val="white"/>
+                </a:solidFill>
+                <a:latin typeface="Calibri"/>
+                <a:ea typeface="+mn-ea"/>
+                <a:cs typeface="+mn-cs"/>
+              </a:rPr>
+              <a:t>.NET, Java, Ruby, </a:t>
+            </a:r>
+            <a:r>
+              <a:rPr lang="en-US" sz="3200" kern="1200" dirty="0" err="1">
+                <a:solidFill>
+                  <a:prstClr val="white"/>
+                </a:solidFill>
+                <a:latin typeface="Calibri"/>
+                <a:ea typeface="+mn-ea"/>
+                <a:cs typeface="+mn-cs"/>
+              </a:rPr>
+              <a:t>Erlang</a:t>
+            </a:r>
+            <a:r>
+              <a:rPr lang="en-US" sz="3200" kern="1200" dirty="0">
+                <a:solidFill>
+                  <a:prstClr val="white"/>
+                </a:solidFill>
+                <a:latin typeface="Calibri"/>
+                <a:ea typeface="+mn-ea"/>
+                <a:cs typeface="+mn-cs"/>
+              </a:rPr>
+              <a:t>, more</a:t>
+            </a:r>
+          </a:p>
+          <a:p>
+            <a:pPr marL="342900" indent="-342900" algn="l" rtl="0">
+              <a:spcBef>
+                <a:spcPct val="20000"/>
+              </a:spcBef>
+              <a:buFont typeface="Arial" pitchFamily="34" charset="0"/>
+              <a:buChar char="•"/>
+              <a:defRPr/>
+            </a:pPr>
+            <a:r>
+              <a:rPr lang="en-US" sz="3200" kern="1200" dirty="0">
+                <a:solidFill>
+                  <a:prstClr val="white"/>
+                </a:solidFill>
+                <a:latin typeface="Calibri"/>
+                <a:ea typeface="+mn-ea"/>
+                <a:cs typeface="+mn-cs"/>
+              </a:rPr>
+              <a:t>Call for speakers – March 31</a:t>
+            </a:r>
+          </a:p>
+          <a:p>
+            <a:pPr marL="742950" lvl="1" indent="-285750" algn="l" rtl="0">
+              <a:spcBef>
+                <a:spcPct val="20000"/>
+              </a:spcBef>
+              <a:buFont typeface="Arial" pitchFamily="34" charset="0"/>
+              <a:buChar char="–"/>
+              <a:defRPr/>
+            </a:pPr>
+            <a:r>
+              <a:rPr lang="en-US" sz="2800" kern="1200" dirty="0">
+                <a:solidFill>
+                  <a:prstClr val="white"/>
+                </a:solidFill>
+                <a:latin typeface="Calibri"/>
+                <a:ea typeface="+mn-ea"/>
+                <a:cs typeface="+mn-cs"/>
+              </a:rPr>
+              <a:t>3 &amp; 6 hour sessions on Friday</a:t>
+            </a:r>
+          </a:p>
+          <a:p>
+            <a:pPr marL="742950" lvl="1" indent="-285750" algn="l" rtl="0">
+              <a:spcBef>
+                <a:spcPct val="20000"/>
+              </a:spcBef>
+              <a:buFont typeface="Arial" pitchFamily="34" charset="0"/>
+              <a:buChar char="–"/>
+              <a:defRPr/>
+            </a:pPr>
+            <a:r>
+              <a:rPr lang="en-US" sz="2800" kern="1200" dirty="0">
+                <a:solidFill>
+                  <a:prstClr val="white"/>
+                </a:solidFill>
+                <a:latin typeface="Calibri"/>
+                <a:ea typeface="+mn-ea"/>
+                <a:cs typeface="+mn-cs"/>
+              </a:rPr>
+              <a:t>1 hour sessions on Saturday</a:t>
+            </a:r>
+          </a:p>
+          <a:p>
+            <a:pPr marL="342900" indent="-342900" algn="l" rtl="0">
+              <a:spcBef>
+                <a:spcPct val="20000"/>
+              </a:spcBef>
+              <a:buFont typeface="Arial" pitchFamily="34" charset="0"/>
+              <a:buChar char="•"/>
+              <a:defRPr/>
+            </a:pPr>
+            <a:r>
+              <a:rPr lang="en-US" sz="3200" kern="1200" dirty="0">
+                <a:solidFill>
+                  <a:prstClr val="white"/>
+                </a:solidFill>
+                <a:latin typeface="Calibri"/>
+                <a:ea typeface="+mn-ea"/>
+                <a:cs typeface="+mn-cs"/>
+              </a:rPr>
+              <a:t>http://CodeStock.org</a:t>
+            </a:r>
+          </a:p>
+          <a:p>
+            <a:pPr marL="342900" indent="-342900" algn="l" rtl="0">
+              <a:spcBef>
+                <a:spcPct val="20000"/>
+              </a:spcBef>
+              <a:buFont typeface="Arial" pitchFamily="34" charset="0"/>
+              <a:buChar char="•"/>
+              <a:defRPr/>
+            </a:pPr>
+            <a:r>
+              <a:rPr lang="en-US" sz="3200" kern="1200" dirty="0">
+                <a:solidFill>
+                  <a:prstClr val="white"/>
+                </a:solidFill>
+                <a:latin typeface="Calibri"/>
+                <a:ea typeface="+mn-ea"/>
+                <a:cs typeface="+mn-cs"/>
+              </a:rPr>
+              <a:t>http://twitter.com/CodeStock</a:t>
+            </a:r>
+          </a:p>
+          <a:p>
+            <a:pPr marL="342900" indent="-342900" algn="l" rtl="0">
+              <a:spcBef>
+                <a:spcPct val="20000"/>
+              </a:spcBef>
+              <a:buFont typeface="Arial" pitchFamily="34" charset="0"/>
+              <a:buChar char="•"/>
+              <a:defRPr/>
+            </a:pPr>
+            <a:endParaRPr lang="en-US" sz="3200" kern="1200" dirty="0">
+              <a:solidFill>
+                <a:prstClr val="white"/>
+              </a:solidFill>
+              <a:latin typeface="Calibri"/>
+              <a:ea typeface="+mn-ea"/>
+              <a:cs typeface="+mn-cs"/>
+            </a:endParaRPr>
+          </a:p>
+        </p:txBody>
+      </p:sp>
+    </p:spTree>
+  </p:cSld>
+  <p:clrMapOvr>
+    <a:masterClrMapping/>
+  </p:clrMapOvr>
+  <p:transition/>
+  <p:timing>
+    <p:tnLst>
+      <p:par>
+        <p:cTn id="1" dur="indefinite" restart="never" nodeType="tmRoot"/>
+      </p:par>
+    </p:tnLst>
+  </p:timing>
+</p:sld>
+</file>
+
+<file path=ppt/slides/slide3.xml><?xml version="1.0" encoding="utf-8"?>
 <p:sld xmlns:a="http://schemas.openxmlformats.org/drawingml/2006/main" xmlns:r="http://schemas.openxmlformats.org/officeDocument/2006/relationships" xmlns:p="http://schemas.openxmlformats.org/presentationml/2006/main">
   <p:cSld>
     <p:bg>
@@ -10561,7 +14398,7 @@
 </p:sld>
 </file>
 
-<file path=ppt/slides/slide3.xml><?xml version="1.0" encoding="utf-8"?>
+<file path=ppt/slides/slide4.xml><?xml version="1.0" encoding="utf-8"?>
 <p:sld xmlns:a="http://schemas.openxmlformats.org/drawingml/2006/main" xmlns:r="http://schemas.openxmlformats.org/officeDocument/2006/relationships" xmlns:p="http://schemas.openxmlformats.org/presentationml/2006/main">
   <p:cSld>
     <p:bg>
@@ -10634,7 +14471,7 @@
 </p:sld>
 </file>
 
-<file path=ppt/slides/slide4.xml><?xml version="1.0" encoding="utf-8"?>
+<file path=ppt/slides/slide5.xml><?xml version="1.0" encoding="utf-8"?>
 <p:sld xmlns:a="http://schemas.openxmlformats.org/drawingml/2006/main" xmlns:r="http://schemas.openxmlformats.org/officeDocument/2006/relationships" xmlns:p="http://schemas.openxmlformats.org/presentationml/2006/main">
   <p:cSld>
     <p:bg>
@@ -10772,7 +14609,7 @@
 </p:sld>
 </file>
 
-<file path=ppt/slides/slide5.xml><?xml version="1.0" encoding="utf-8"?>
+<file path=ppt/slides/slide6.xml><?xml version="1.0" encoding="utf-8"?>
 <p:sld xmlns:a="http://schemas.openxmlformats.org/drawingml/2006/main" xmlns:r="http://schemas.openxmlformats.org/officeDocument/2006/relationships" xmlns:p="http://schemas.openxmlformats.org/presentationml/2006/main">
   <p:cSld>
     <p:spTree>
@@ -11016,7 +14853,7 @@
 </p:sld>
 </file>
 
-<file path=ppt/slides/slide6.xml><?xml version="1.0" encoding="utf-8"?>
+<file path=ppt/slides/slide7.xml><?xml version="1.0" encoding="utf-8"?>
 <p:sld xmlns:a="http://schemas.openxmlformats.org/drawingml/2006/main" xmlns:r="http://schemas.openxmlformats.org/officeDocument/2006/relationships" xmlns:p="http://schemas.openxmlformats.org/presentationml/2006/main">
   <p:cSld>
     <p:spTree>
@@ -12090,4 +15927,287 @@
   <a:objectDefaults/>
   <a:extraClrSchemeLst/>
 </a:theme>
+</file>
+
+<file path=ppt/theme/theme4.xml><?xml version="1.0" encoding="utf-8"?>
+<a:theme xmlns:a="http://schemas.openxmlformats.org/drawingml/2006/main" name="3_Office Theme">
+  <a:themeElements>
+    <a:clrScheme name="Office">
+      <a:dk1>
+        <a:sysClr val="windowText" lastClr="000000"/>
+      </a:dk1>
+      <a:lt1>
+        <a:sysClr val="window" lastClr="FFFFFF"/>
+      </a:lt1>
+      <a:dk2>
+        <a:srgbClr val="1F497D"/>
+      </a:dk2>
+      <a:lt2>
+        <a:srgbClr val="EEECE1"/>
+      </a:lt2>
+      <a:accent1>
+        <a:srgbClr val="4F81BD"/>
+      </a:accent1>
+      <a:accent2>
+        <a:srgbClr val="C0504D"/>
+      </a:accent2>
+      <a:accent3>
+        <a:srgbClr val="9BBB59"/>
+      </a:accent3>
+      <a:accent4>
+        <a:srgbClr val="8064A2"/>
+      </a:accent4>
+      <a:accent5>
+        <a:srgbClr val="4BACC6"/>
+      </a:accent5>
+      <a:accent6>
+        <a:srgbClr val="F79646"/>
+      </a:accent6>
+      <a:hlink>
+        <a:srgbClr val="0000FF"/>
+      </a:hlink>
+      <a:folHlink>
+        <a:srgbClr val="800080"/>
+      </a:folHlink>
+    </a:clrScheme>
+    <a:fontScheme name="Office">
+      <a:majorFont>
+        <a:latin typeface="Calibri"/>
+        <a:ea typeface=""/>
+        <a:cs typeface=""/>
+        <a:font script="Jpan" typeface="ＭＳ Ｐゴシック"/>
+        <a:font script="Hang" typeface="맑은 고딕"/>
+        <a:font script="Hans" typeface="宋体"/>
+        <a:font script="Hant" typeface="新細明體"/>
+        <a:font script="Arab" typeface="Times New Roman"/>
+        <a:font script="Hebr" typeface="Times New Roman"/>
+        <a:font script="Thai" typeface="Angsana New"/>
+        <a:font script="Ethi" typeface="Nyala"/>
+        <a:font script="Beng" typeface="Vrinda"/>
+        <a:font script="Gujr" typeface="Shruti"/>
+        <a:font script="Khmr" typeface="MoolBoran"/>
+        <a:font script="Knda" typeface="Tunga"/>
+        <a:font script="Guru" typeface="Raavi"/>
+        <a:font script="Cans" typeface="Euphemia"/>
+        <a:font script="Cher" typeface="Plantagenet Cherokee"/>
+        <a:font script="Yiii" typeface="Microsoft Yi Baiti"/>
+        <a:font script="Tibt" typeface="Microsoft Himalaya"/>
+        <a:font script="Thaa" typeface="MV Boli"/>
+        <a:font script="Deva" typeface="Mangal"/>
+        <a:font script="Telu" typeface="Gautami"/>
+        <a:font script="Taml" typeface="Latha"/>
+        <a:font script="Syrc" typeface="Estrangelo Edessa"/>
+        <a:font script="Orya" typeface="Kalinga"/>
+        <a:font script="Mlym" typeface="Kartika"/>
+        <a:font script="Laoo" typeface="DokChampa"/>
+        <a:font script="Sinh" typeface="Iskoola Pota"/>
+        <a:font script="Mong" typeface="Mongolian Baiti"/>
+        <a:font script="Viet" typeface="Times New Roman"/>
+        <a:font script="Uigh" typeface="Microsoft Uighur"/>
+      </a:majorFont>
+      <a:minorFont>
+        <a:latin typeface="Calibri"/>
+        <a:ea typeface=""/>
+        <a:cs typeface=""/>
+        <a:font script="Jpan" typeface="ＭＳ Ｐゴシック"/>
+        <a:font script="Hang" typeface="맑은 고딕"/>
+        <a:font script="Hans" typeface="宋体"/>
+        <a:font script="Hant" typeface="新細明體"/>
+        <a:font script="Arab" typeface="Arial"/>
+        <a:font script="Hebr" typeface="Arial"/>
+        <a:font script="Thai" typeface="Cordia New"/>
+        <a:font script="Ethi" typeface="Nyala"/>
+        <a:font script="Beng" typeface="Vrinda"/>
+        <a:font script="Gujr" typeface="Shruti"/>
+        <a:font script="Khmr" typeface="DaunPenh"/>
+        <a:font script="Knda" typeface="Tunga"/>
+        <a:font script="Guru" typeface="Raavi"/>
+        <a:font script="Cans" typeface="Euphemia"/>
+        <a:font script="Cher" typeface="Plantagenet Cherokee"/>
+        <a:font script="Yiii" typeface="Microsoft Yi Baiti"/>
+        <a:font script="Tibt" typeface="Microsoft Himalaya"/>
+        <a:font script="Thaa" typeface="MV Boli"/>
+        <a:font script="Deva" typeface="Mangal"/>
+        <a:font script="Telu" typeface="Gautami"/>
+        <a:font script="Taml" typeface="Latha"/>
+        <a:font script="Syrc" typeface="Estrangelo Edessa"/>
+        <a:font script="Orya" typeface="Kalinga"/>
+        <a:font script="Mlym" typeface="Kartika"/>
+        <a:font script="Laoo" typeface="DokChampa"/>
+        <a:font script="Sinh" typeface="Iskoola Pota"/>
+        <a:font script="Mong" typeface="Mongolian Baiti"/>
+        <a:font script="Viet" typeface="Arial"/>
+        <a:font script="Uigh" typeface="Microsoft Uighur"/>
+      </a:minorFont>
+    </a:fontScheme>
+    <a:fmtScheme name="Office">
+      <a:fillStyleLst>
+        <a:solidFill>
+          <a:schemeClr val="phClr"/>
+        </a:solidFill>
+        <a:gradFill rotWithShape="1">
+          <a:gsLst>
+            <a:gs pos="0">
+              <a:schemeClr val="phClr">
+                <a:tint val="50000"/>
+                <a:satMod val="300000"/>
+              </a:schemeClr>
+            </a:gs>
+            <a:gs pos="35000">
+              <a:schemeClr val="phClr">
+                <a:tint val="37000"/>
+                <a:satMod val="300000"/>
+              </a:schemeClr>
+            </a:gs>
+            <a:gs pos="100000">
+              <a:schemeClr val="phClr">
+                <a:tint val="15000"/>
+                <a:satMod val="350000"/>
+              </a:schemeClr>
+            </a:gs>
+          </a:gsLst>
+          <a:lin ang="16200000" scaled="1"/>
+        </a:gradFill>
+        <a:gradFill rotWithShape="1">
+          <a:gsLst>
+            <a:gs pos="0">
+              <a:schemeClr val="phClr">
+                <a:shade val="51000"/>
+                <a:satMod val="130000"/>
+              </a:schemeClr>
+            </a:gs>
+            <a:gs pos="80000">
+              <a:schemeClr val="phClr">
+                <a:shade val="93000"/>
+                <a:satMod val="130000"/>
+              </a:schemeClr>
+            </a:gs>
+            <a:gs pos="100000">
+              <a:schemeClr val="phClr">
+                <a:shade val="94000"/>
+                <a:satMod val="135000"/>
+              </a:schemeClr>
+            </a:gs>
+          </a:gsLst>
+          <a:lin ang="16200000" scaled="0"/>
+        </a:gradFill>
+      </a:fillStyleLst>
+      <a:lnStyleLst>
+        <a:ln w="9525" cap="flat" cmpd="sng" algn="ctr">
+          <a:solidFill>
+            <a:schemeClr val="phClr">
+              <a:shade val="95000"/>
+              <a:satMod val="105000"/>
+            </a:schemeClr>
+          </a:solidFill>
+          <a:prstDash val="solid"/>
+        </a:ln>
+        <a:ln w="25400" cap="flat" cmpd="sng" algn="ctr">
+          <a:solidFill>
+            <a:schemeClr val="phClr"/>
+          </a:solidFill>
+          <a:prstDash val="solid"/>
+        </a:ln>
+        <a:ln w="38100" cap="flat" cmpd="sng" algn="ctr">
+          <a:solidFill>
+            <a:schemeClr val="phClr"/>
+          </a:solidFill>
+          <a:prstDash val="solid"/>
+        </a:ln>
+      </a:lnStyleLst>
+      <a:effectStyleLst>
+        <a:effectStyle>
+          <a:effectLst>
+            <a:outerShdw blurRad="40000" dist="20000" dir="5400000" rotWithShape="0">
+              <a:srgbClr val="000000">
+                <a:alpha val="38000"/>
+              </a:srgbClr>
+            </a:outerShdw>
+          </a:effectLst>
+        </a:effectStyle>
+        <a:effectStyle>
+          <a:effectLst>
+            <a:outerShdw blurRad="40000" dist="23000" dir="5400000" rotWithShape="0">
+              <a:srgbClr val="000000">
+                <a:alpha val="35000"/>
+              </a:srgbClr>
+            </a:outerShdw>
+          </a:effectLst>
+        </a:effectStyle>
+        <a:effectStyle>
+          <a:effectLst>
+            <a:outerShdw blurRad="40000" dist="23000" dir="5400000" rotWithShape="0">
+              <a:srgbClr val="000000">
+                <a:alpha val="35000"/>
+              </a:srgbClr>
+            </a:outerShdw>
+          </a:effectLst>
+          <a:scene3d>
+            <a:camera prst="orthographicFront">
+              <a:rot lat="0" lon="0" rev="0"/>
+            </a:camera>
+            <a:lightRig rig="threePt" dir="t">
+              <a:rot lat="0" lon="0" rev="1200000"/>
+            </a:lightRig>
+          </a:scene3d>
+          <a:sp3d>
+            <a:bevelT w="63500" h="25400"/>
+          </a:sp3d>
+        </a:effectStyle>
+      </a:effectStyleLst>
+      <a:bgFillStyleLst>
+        <a:solidFill>
+          <a:schemeClr val="phClr"/>
+        </a:solidFill>
+        <a:gradFill rotWithShape="1">
+          <a:gsLst>
+            <a:gs pos="0">
+              <a:schemeClr val="phClr">
+                <a:tint val="40000"/>
+                <a:satMod val="350000"/>
+              </a:schemeClr>
+            </a:gs>
+            <a:gs pos="40000">
+              <a:schemeClr val="phClr">
+                <a:tint val="45000"/>
+                <a:shade val="99000"/>
+                <a:satMod val="350000"/>
+              </a:schemeClr>
+            </a:gs>
+            <a:gs pos="100000">
+              <a:schemeClr val="phClr">
+                <a:shade val="20000"/>
+                <a:satMod val="255000"/>
+              </a:schemeClr>
+            </a:gs>
+          </a:gsLst>
+          <a:path path="circle">
+            <a:fillToRect l="50000" t="-80000" r="50000" b="180000"/>
+          </a:path>
+        </a:gradFill>
+        <a:gradFill rotWithShape="1">
+          <a:gsLst>
+            <a:gs pos="0">
+              <a:schemeClr val="phClr">
+                <a:tint val="80000"/>
+                <a:satMod val="300000"/>
+              </a:schemeClr>
+            </a:gs>
+            <a:gs pos="100000">
+              <a:schemeClr val="phClr">
+                <a:shade val="30000"/>
+                <a:satMod val="200000"/>
+              </a:schemeClr>
+            </a:gs>
+          </a:gsLst>
+          <a:path path="circle">
+            <a:fillToRect l="50000" t="50000" r="50000" b="50000"/>
+          </a:path>
+        </a:gradFill>
+      </a:bgFillStyleLst>
+    </a:fmtScheme>
+  </a:themeElements>
+  <a:objectDefaults/>
+  <a:extraClrSchemeLst/>
+</a:theme>
 </file>
</xml_diff>